<commit_message>
Just finished up the  preamble detection section...Starting on Freq offset compensation
</commit_message>
<xml_diff>
--- a/figures/systemOverview/systemOverview.pptx
+++ b/figures/systemOverview/systemOverview.pptx
@@ -281,7 +281,7 @@
           <a:p>
             <a:fld id="{61E06506-3CEE-4661-A7C6-5024C13C4392}" type="datetimeFigureOut">
               <a:rPr lang="en-US" smtClean="0"/>
-              <a:t>1/11/2017</a:t>
+              <a:t>1/12/2017</a:t>
             </a:fld>
             <a:endParaRPr lang="en-US"/>
           </a:p>
@@ -451,7 +451,7 @@
           <a:p>
             <a:fld id="{61E06506-3CEE-4661-A7C6-5024C13C4392}" type="datetimeFigureOut">
               <a:rPr lang="en-US" smtClean="0"/>
-              <a:t>1/11/2017</a:t>
+              <a:t>1/12/2017</a:t>
             </a:fld>
             <a:endParaRPr lang="en-US"/>
           </a:p>
@@ -631,7 +631,7 @@
           <a:p>
             <a:fld id="{61E06506-3CEE-4661-A7C6-5024C13C4392}" type="datetimeFigureOut">
               <a:rPr lang="en-US" smtClean="0"/>
-              <a:t>1/11/2017</a:t>
+              <a:t>1/12/2017</a:t>
             </a:fld>
             <a:endParaRPr lang="en-US"/>
           </a:p>
@@ -801,7 +801,7 @@
           <a:p>
             <a:fld id="{61E06506-3CEE-4661-A7C6-5024C13C4392}" type="datetimeFigureOut">
               <a:rPr lang="en-US" smtClean="0"/>
-              <a:t>1/11/2017</a:t>
+              <a:t>1/12/2017</a:t>
             </a:fld>
             <a:endParaRPr lang="en-US"/>
           </a:p>
@@ -1047,7 +1047,7 @@
           <a:p>
             <a:fld id="{61E06506-3CEE-4661-A7C6-5024C13C4392}" type="datetimeFigureOut">
               <a:rPr lang="en-US" smtClean="0"/>
-              <a:t>1/11/2017</a:t>
+              <a:t>1/12/2017</a:t>
             </a:fld>
             <a:endParaRPr lang="en-US"/>
           </a:p>
@@ -1279,7 +1279,7 @@
           <a:p>
             <a:fld id="{61E06506-3CEE-4661-A7C6-5024C13C4392}" type="datetimeFigureOut">
               <a:rPr lang="en-US" smtClean="0"/>
-              <a:t>1/11/2017</a:t>
+              <a:t>1/12/2017</a:t>
             </a:fld>
             <a:endParaRPr lang="en-US"/>
           </a:p>
@@ -1646,7 +1646,7 @@
           <a:p>
             <a:fld id="{61E06506-3CEE-4661-A7C6-5024C13C4392}" type="datetimeFigureOut">
               <a:rPr lang="en-US" smtClean="0"/>
-              <a:t>1/11/2017</a:t>
+              <a:t>1/12/2017</a:t>
             </a:fld>
             <a:endParaRPr lang="en-US"/>
           </a:p>
@@ -1764,7 +1764,7 @@
           <a:p>
             <a:fld id="{61E06506-3CEE-4661-A7C6-5024C13C4392}" type="datetimeFigureOut">
               <a:rPr lang="en-US" smtClean="0"/>
-              <a:t>1/11/2017</a:t>
+              <a:t>1/12/2017</a:t>
             </a:fld>
             <a:endParaRPr lang="en-US"/>
           </a:p>
@@ -1859,7 +1859,7 @@
           <a:p>
             <a:fld id="{61E06506-3CEE-4661-A7C6-5024C13C4392}" type="datetimeFigureOut">
               <a:rPr lang="en-US" smtClean="0"/>
-              <a:t>1/11/2017</a:t>
+              <a:t>1/12/2017</a:t>
             </a:fld>
             <a:endParaRPr lang="en-US"/>
           </a:p>
@@ -2136,7 +2136,7 @@
           <a:p>
             <a:fld id="{61E06506-3CEE-4661-A7C6-5024C13C4392}" type="datetimeFigureOut">
               <a:rPr lang="en-US" smtClean="0"/>
-              <a:t>1/11/2017</a:t>
+              <a:t>1/12/2017</a:t>
             </a:fld>
             <a:endParaRPr lang="en-US"/>
           </a:p>
@@ -2389,7 +2389,7 @@
           <a:p>
             <a:fld id="{61E06506-3CEE-4661-A7C6-5024C13C4392}" type="datetimeFigureOut">
               <a:rPr lang="en-US" smtClean="0"/>
-              <a:t>1/11/2017</a:t>
+              <a:t>1/12/2017</a:t>
             </a:fld>
             <a:endParaRPr lang="en-US"/>
           </a:p>
@@ -2602,7 +2602,7 @@
           <a:p>
             <a:fld id="{61E06506-3CEE-4661-A7C6-5024C13C4392}" type="datetimeFigureOut">
               <a:rPr lang="en-US" smtClean="0"/>
-              <a:t>1/11/2017</a:t>
+              <a:t>1/12/2017</a:t>
             </a:fld>
             <a:endParaRPr lang="en-US"/>
           </a:p>
@@ -3179,7 +3179,7 @@
       </p:sp>
       <p:grpSp>
         <p:nvGrpSpPr>
-          <p:cNvPr id="4" name="Group 3"/>
+          <p:cNvPr id="15" name="Group 14"/>
           <p:cNvGrpSpPr/>
           <p:nvPr/>
         </p:nvGrpSpPr>
@@ -3193,16 +3193,20 @@
         </p:grpSpPr>
         <p:grpSp>
           <p:nvGrpSpPr>
-            <p:cNvPr id="117" name="Group 116"/>
+            <p:cNvPr id="14" name="Group 13"/>
             <p:cNvGrpSpPr/>
-            <p:nvPr/>
+            <p:nvPr>
+              <p:custDataLst>
+                <p:tags r:id="rId1"/>
+              </p:custDataLst>
+            </p:nvPr>
           </p:nvGrpSpPr>
           <p:grpSpPr>
             <a:xfrm>
-              <a:off x="1383145" y="684355"/>
-              <a:ext cx="8350491" cy="2973245"/>
-              <a:chOff x="1149604" y="684355"/>
-              <a:chExt cx="8350491" cy="2973245"/>
+              <a:off x="1468392" y="684355"/>
+              <a:ext cx="8265244" cy="2973245"/>
+              <a:chOff x="1468392" y="684355"/>
+              <a:chExt cx="8265244" cy="2973245"/>
             </a:xfrm>
           </p:grpSpPr>
           <p:sp>
@@ -3213,7 +3217,7 @@
             </p:nvSpPr>
             <p:spPr>
               <a:xfrm>
-                <a:off x="2439877" y="684355"/>
+                <a:off x="2673418" y="684355"/>
                 <a:ext cx="1143000" cy="1143000"/>
               </a:xfrm>
               <a:prstGeom prst="rect">
@@ -3267,25 +3271,7 @@
                     <a:latin typeface="Times New Roman" panose="02020603050405020304" pitchFamily="18" charset="0"/>
                     <a:cs typeface="Times New Roman" panose="02020603050405020304" pitchFamily="18" charset="0"/>
                   </a:rPr>
-                  <a:t>preamble </a:t>
-                </a:r>
-                <a:r>
-                  <a:rPr lang="en-US" dirty="0" smtClean="0">
-                    <a:ln w="0"/>
-                    <a:solidFill>
-                      <a:schemeClr val="tx1"/>
-                    </a:solidFill>
-                    <a:effectLst>
-                      <a:outerShdw blurRad="38100" dist="19050" dir="2700000" algn="tl" rotWithShape="0">
-                        <a:schemeClr val="dk1">
-                          <a:alpha val="40000"/>
-                        </a:schemeClr>
-                      </a:outerShdw>
-                    </a:effectLst>
-                    <a:latin typeface="Times New Roman" panose="02020603050405020304" pitchFamily="18" charset="0"/>
-                    <a:cs typeface="Times New Roman" panose="02020603050405020304" pitchFamily="18" charset="0"/>
-                  </a:rPr>
-                  <a:t>detection</a:t>
+                  <a:t>preamble detection</a:t>
                 </a:r>
                 <a:endParaRPr lang="en-US" dirty="0">
                   <a:latin typeface="Times New Roman" panose="02020603050405020304" pitchFamily="18" charset="0"/>
@@ -3302,7 +3288,7 @@
             </p:nvSpPr>
             <p:spPr>
               <a:xfrm>
-                <a:off x="4267200" y="684355"/>
+                <a:off x="4500741" y="684355"/>
                 <a:ext cx="1143000" cy="1143000"/>
               </a:xfrm>
               <a:prstGeom prst="rect">
@@ -3373,7 +3359,7 @@
             </p:nvSpPr>
             <p:spPr>
               <a:xfrm>
-                <a:off x="7315200" y="684355"/>
+                <a:off x="7548741" y="684355"/>
                 <a:ext cx="1143000" cy="1143000"/>
               </a:xfrm>
               <a:prstGeom prst="rect">
@@ -3465,7 +3451,7 @@
             </p:nvSpPr>
             <p:spPr>
               <a:xfrm>
-                <a:off x="7315200" y="2514600"/>
+                <a:off x="7548741" y="2514600"/>
                 <a:ext cx="1143000" cy="1143000"/>
               </a:xfrm>
               <a:prstGeom prst="rect">
@@ -3557,40 +3543,6 @@
               </p:cNvPicPr>
               <p:nvPr>
                 <p:custDataLst>
-                  <p:tags r:id="rId8"/>
-                </p:custDataLst>
-              </p:nvPr>
-            </p:nvPicPr>
-            <p:blipFill>
-              <a:blip r:embed="rId14" cstate="print">
-                <a:extLst>
-                  <a:ext uri="{28A0092B-C50C-407E-A947-70E740481C1C}">
-                    <a14:useLocalDpi xmlns:a14="http://schemas.microsoft.com/office/drawing/2010/main" val="0"/>
-                  </a:ext>
-                </a:extLst>
-              </a:blip>
-              <a:stretch>
-                <a:fillRect/>
-              </a:stretch>
-            </p:blipFill>
-            <p:spPr>
-              <a:xfrm>
-                <a:off x="6768246" y="1057567"/>
-                <a:ext cx="103619" cy="114286"/>
-              </a:xfrm>
-              <a:prstGeom prst="rect">
-                <a:avLst/>
-              </a:prstGeom>
-            </p:spPr>
-          </p:pic>
-          <p:pic>
-            <p:nvPicPr>
-              <p:cNvPr id="36" name="Picture 35"/>
-              <p:cNvPicPr>
-                <a:picLocks noChangeAspect="1"/>
-              </p:cNvPicPr>
-              <p:nvPr>
-                <p:custDataLst>
                   <p:tags r:id="rId9"/>
                 </p:custDataLst>
               </p:nvPr>
@@ -3609,8 +3561,42 @@
             </p:blipFill>
             <p:spPr>
               <a:xfrm>
-                <a:off x="1149604" y="1130139"/>
-                <a:ext cx="524190" cy="251429"/>
+                <a:off x="7001787" y="1057567"/>
+                <a:ext cx="103619" cy="114286"/>
+              </a:xfrm>
+              <a:prstGeom prst="rect">
+                <a:avLst/>
+              </a:prstGeom>
+            </p:spPr>
+          </p:pic>
+          <p:pic>
+            <p:nvPicPr>
+              <p:cNvPr id="13" name="Picture 12"/>
+              <p:cNvPicPr>
+                <a:picLocks noChangeAspect="1"/>
+              </p:cNvPicPr>
+              <p:nvPr>
+                <p:custDataLst>
+                  <p:tags r:id="rId10"/>
+                </p:custDataLst>
+              </p:nvPr>
+            </p:nvPicPr>
+            <p:blipFill>
+              <a:blip r:embed="rId16" cstate="print">
+                <a:extLst>
+                  <a:ext uri="{28A0092B-C50C-407E-A947-70E740481C1C}">
+                    <a14:useLocalDpi xmlns:a14="http://schemas.microsoft.com/office/drawing/2010/main" val="0"/>
+                  </a:ext>
+                </a:extLst>
+              </a:blip>
+              <a:stretch>
+                <a:fillRect/>
+              </a:stretch>
+            </p:blipFill>
+            <p:spPr>
+              <a:xfrm>
+                <a:off x="1468392" y="1136072"/>
+                <a:ext cx="440381" cy="251429"/>
               </a:xfrm>
               <a:prstGeom prst="rect">
                 <a:avLst/>
@@ -3625,7 +3611,7 @@
             </p:nvSpPr>
             <p:spPr>
               <a:xfrm>
-                <a:off x="6101862" y="989155"/>
+                <a:off x="6335403" y="989155"/>
                 <a:ext cx="533400" cy="533400"/>
               </a:xfrm>
               <a:prstGeom prst="flowChartSummingJunction">
@@ -3678,7 +3664,7 @@
             </p:nvCxnSpPr>
             <p:spPr>
               <a:xfrm flipV="1">
-                <a:off x="5410200" y="1255854"/>
+                <a:off x="5643741" y="1255854"/>
                 <a:ext cx="691662" cy="2"/>
               </a:xfrm>
               <a:prstGeom prst="straightConnector1">
@@ -3717,7 +3703,7 @@
             </p:nvCxnSpPr>
             <p:spPr>
               <a:xfrm>
-                <a:off x="6635262" y="1255855"/>
+                <a:off x="6868803" y="1255855"/>
                 <a:ext cx="679938" cy="0"/>
               </a:xfrm>
               <a:prstGeom prst="straightConnector1">
@@ -3755,7 +3741,7 @@
             </p:nvCxnSpPr>
             <p:spPr>
               <a:xfrm rot="16200000" flipH="1">
-                <a:off x="6230093" y="2000993"/>
+                <a:off x="6463634" y="2000993"/>
                 <a:ext cx="1830246" cy="339968"/>
               </a:xfrm>
               <a:prstGeom prst="bentConnector2">
@@ -3794,7 +3780,7 @@
             </p:nvCxnSpPr>
             <p:spPr>
               <a:xfrm rot="16200000" flipH="1">
-                <a:off x="5010405" y="164397"/>
+                <a:off x="5243946" y="164397"/>
                 <a:ext cx="270105" cy="2446209"/>
               </a:xfrm>
               <a:prstGeom prst="bentConnector3">
@@ -3832,7 +3818,7 @@
             </p:nvCxnSpPr>
             <p:spPr>
               <a:xfrm>
-                <a:off x="6629400" y="1255855"/>
+                <a:off x="6862941" y="1255855"/>
                 <a:ext cx="691662" cy="0"/>
               </a:xfrm>
               <a:prstGeom prst="straightConnector1">
@@ -3868,7 +3854,7 @@
             </p:nvCxnSpPr>
             <p:spPr>
               <a:xfrm>
-                <a:off x="8458200" y="1255855"/>
+                <a:off x="8691741" y="1255855"/>
                 <a:ext cx="691662" cy="0"/>
               </a:xfrm>
               <a:prstGeom prst="straightConnector1">
@@ -3899,76 +3885,6 @@
           <p:pic>
             <p:nvPicPr>
               <p:cNvPr id="45" name="Picture 44"/>
-              <p:cNvPicPr>
-                <a:picLocks noChangeAspect="1"/>
-              </p:cNvPicPr>
-              <p:nvPr>
-                <p:custDataLst>
-                  <p:tags r:id="rId10"/>
-                </p:custDataLst>
-              </p:nvPr>
-            </p:nvPicPr>
-            <p:blipFill>
-              <a:blip r:embed="rId16" cstate="print">
-                <a:extLst>
-                  <a:ext uri="{28A0092B-C50C-407E-A947-70E740481C1C}">
-                    <a14:useLocalDpi xmlns:a14="http://schemas.microsoft.com/office/drawing/2010/main" val="0"/>
-                  </a:ext>
-                </a:extLst>
-              </a:blip>
-              <a:stretch>
-                <a:fillRect/>
-              </a:stretch>
-            </p:blipFill>
-            <p:spPr>
-              <a:xfrm>
-                <a:off x="9220200" y="1134712"/>
-                <a:ext cx="146286" cy="242286"/>
-              </a:xfrm>
-              <a:prstGeom prst="rect">
-                <a:avLst/>
-              </a:prstGeom>
-            </p:spPr>
-          </p:pic>
-          <p:cxnSp>
-            <p:nvCxnSpPr>
-              <p:cNvPr id="46" name="Straight Arrow Connector 45"/>
-              <p:cNvCxnSpPr/>
-              <p:nvPr/>
-            </p:nvCxnSpPr>
-            <p:spPr>
-              <a:xfrm>
-                <a:off x="8458200" y="3086100"/>
-                <a:ext cx="691662" cy="0"/>
-              </a:xfrm>
-              <a:prstGeom prst="straightConnector1">
-                <a:avLst/>
-              </a:prstGeom>
-              <a:ln>
-                <a:solidFill>
-                  <a:schemeClr val="tx1"/>
-                </a:solidFill>
-                <a:tailEnd type="triangle"/>
-              </a:ln>
-            </p:spPr>
-            <p:style>
-              <a:lnRef idx="1">
-                <a:schemeClr val="accent1"/>
-              </a:lnRef>
-              <a:fillRef idx="0">
-                <a:schemeClr val="accent1"/>
-              </a:fillRef>
-              <a:effectRef idx="0">
-                <a:schemeClr val="accent1"/>
-              </a:effectRef>
-              <a:fontRef idx="minor">
-                <a:schemeClr val="tx1"/>
-              </a:fontRef>
-            </p:style>
-          </p:cxnSp>
-          <p:pic>
-            <p:nvPicPr>
-              <p:cNvPr id="48" name="Picture 47"/>
               <p:cNvPicPr>
                 <a:picLocks noChangeAspect="1"/>
               </p:cNvPicPr>
@@ -3992,8 +3908,8 @@
             </p:blipFill>
             <p:spPr>
               <a:xfrm>
-                <a:off x="9225809" y="2948957"/>
-                <a:ext cx="274286" cy="274286"/>
+                <a:off x="9453741" y="1134712"/>
+                <a:ext cx="146286" cy="242286"/>
               </a:xfrm>
               <a:prstGeom prst="rect">
                 <a:avLst/>
@@ -4002,17 +3918,14 @@
           </p:pic>
           <p:cxnSp>
             <p:nvCxnSpPr>
-              <p:cNvPr id="84" name="Straight Arrow Connector 83"/>
-              <p:cNvCxnSpPr>
-                <a:stCxn id="5" idx="3"/>
-                <a:endCxn id="6" idx="1"/>
-              </p:cNvCxnSpPr>
+              <p:cNvPr id="46" name="Straight Arrow Connector 45"/>
+              <p:cNvCxnSpPr/>
               <p:nvPr/>
             </p:nvCxnSpPr>
             <p:spPr>
               <a:xfrm>
-                <a:off x="3582877" y="1255855"/>
-                <a:ext cx="684323" cy="0"/>
+                <a:off x="8691741" y="3086100"/>
+                <a:ext cx="691662" cy="0"/>
               </a:xfrm>
               <a:prstGeom prst="straightConnector1">
                 <a:avLst/>
@@ -4039,45 +3952,9 @@
               </a:fontRef>
             </p:style>
           </p:cxnSp>
-          <p:cxnSp>
-            <p:nvCxnSpPr>
-              <p:cNvPr id="87" name="Straight Arrow Connector 86"/>
-              <p:cNvCxnSpPr/>
-              <p:nvPr/>
-            </p:nvCxnSpPr>
-            <p:spPr>
-              <a:xfrm>
-                <a:off x="1745266" y="1255854"/>
-                <a:ext cx="684323" cy="0"/>
-              </a:xfrm>
-              <a:prstGeom prst="straightConnector1">
-                <a:avLst/>
-              </a:prstGeom>
-              <a:ln>
-                <a:solidFill>
-                  <a:schemeClr val="tx1"/>
-                </a:solidFill>
-                <a:tailEnd type="triangle"/>
-              </a:ln>
-            </p:spPr>
-            <p:style>
-              <a:lnRef idx="1">
-                <a:schemeClr val="accent1"/>
-              </a:lnRef>
-              <a:fillRef idx="0">
-                <a:schemeClr val="accent1"/>
-              </a:fillRef>
-              <a:effectRef idx="0">
-                <a:schemeClr val="accent1"/>
-              </a:effectRef>
-              <a:fontRef idx="minor">
-                <a:schemeClr val="tx1"/>
-              </a:fontRef>
-            </p:style>
-          </p:cxnSp>
           <p:pic>
             <p:nvPicPr>
-              <p:cNvPr id="91" name="Picture 90"/>
+              <p:cNvPr id="48" name="Picture 47"/>
               <p:cNvPicPr>
                 <a:picLocks noChangeAspect="1"/>
               </p:cNvPicPr>
@@ -4101,7 +3978,116 @@
             </p:blipFill>
             <p:spPr>
               <a:xfrm>
-                <a:off x="3716673" y="990600"/>
+                <a:off x="9459350" y="2948957"/>
+                <a:ext cx="274286" cy="274286"/>
+              </a:xfrm>
+              <a:prstGeom prst="rect">
+                <a:avLst/>
+              </a:prstGeom>
+            </p:spPr>
+          </p:pic>
+          <p:cxnSp>
+            <p:nvCxnSpPr>
+              <p:cNvPr id="84" name="Straight Arrow Connector 83"/>
+              <p:cNvCxnSpPr>
+                <a:stCxn id="5" idx="3"/>
+                <a:endCxn id="6" idx="1"/>
+              </p:cNvCxnSpPr>
+              <p:nvPr/>
+            </p:nvCxnSpPr>
+            <p:spPr>
+              <a:xfrm>
+                <a:off x="3816418" y="1255855"/>
+                <a:ext cx="684323" cy="0"/>
+              </a:xfrm>
+              <a:prstGeom prst="straightConnector1">
+                <a:avLst/>
+              </a:prstGeom>
+              <a:ln>
+                <a:solidFill>
+                  <a:schemeClr val="tx1"/>
+                </a:solidFill>
+                <a:tailEnd type="triangle"/>
+              </a:ln>
+            </p:spPr>
+            <p:style>
+              <a:lnRef idx="1">
+                <a:schemeClr val="accent1"/>
+              </a:lnRef>
+              <a:fillRef idx="0">
+                <a:schemeClr val="accent1"/>
+              </a:fillRef>
+              <a:effectRef idx="0">
+                <a:schemeClr val="accent1"/>
+              </a:effectRef>
+              <a:fontRef idx="minor">
+                <a:schemeClr val="tx1"/>
+              </a:fontRef>
+            </p:style>
+          </p:cxnSp>
+          <p:cxnSp>
+            <p:nvCxnSpPr>
+              <p:cNvPr id="87" name="Straight Arrow Connector 86"/>
+              <p:cNvCxnSpPr/>
+              <p:nvPr/>
+            </p:nvCxnSpPr>
+            <p:spPr>
+              <a:xfrm>
+                <a:off x="1978807" y="1255854"/>
+                <a:ext cx="684323" cy="0"/>
+              </a:xfrm>
+              <a:prstGeom prst="straightConnector1">
+                <a:avLst/>
+              </a:prstGeom>
+              <a:ln>
+                <a:solidFill>
+                  <a:schemeClr val="tx1"/>
+                </a:solidFill>
+                <a:tailEnd type="triangle"/>
+              </a:ln>
+            </p:spPr>
+            <p:style>
+              <a:lnRef idx="1">
+                <a:schemeClr val="accent1"/>
+              </a:lnRef>
+              <a:fillRef idx="0">
+                <a:schemeClr val="accent1"/>
+              </a:fillRef>
+              <a:effectRef idx="0">
+                <a:schemeClr val="accent1"/>
+              </a:effectRef>
+              <a:fontRef idx="minor">
+                <a:schemeClr val="tx1"/>
+              </a:fontRef>
+            </p:style>
+          </p:cxnSp>
+          <p:pic>
+            <p:nvPicPr>
+              <p:cNvPr id="91" name="Picture 90"/>
+              <p:cNvPicPr>
+                <a:picLocks noChangeAspect="1"/>
+              </p:cNvPicPr>
+              <p:nvPr>
+                <p:custDataLst>
+                  <p:tags r:id="rId13"/>
+                </p:custDataLst>
+              </p:nvPr>
+            </p:nvPicPr>
+            <p:blipFill>
+              <a:blip r:embed="rId19" cstate="print">
+                <a:extLst>
+                  <a:ext uri="{28A0092B-C50C-407E-A947-70E740481C1C}">
+                    <a14:useLocalDpi xmlns:a14="http://schemas.microsoft.com/office/drawing/2010/main" val="0"/>
+                  </a:ext>
+                </a:extLst>
+              </a:blip>
+              <a:stretch>
+                <a:fillRect/>
+              </a:stretch>
+            </p:blipFill>
+            <p:spPr>
+              <a:xfrm>
+                <a:off x="3950214" y="990600"/>
                 <a:ext cx="396190" cy="185905"/>
               </a:xfrm>
               <a:prstGeom prst="rect">
@@ -4117,7 +4103,7 @@
             </p:nvSpPr>
             <p:spPr>
               <a:xfrm>
-                <a:off x="3580436" y="860533"/>
+                <a:off x="3813977" y="860533"/>
                 <a:ext cx="683833" cy="391917"/>
               </a:xfrm>
               <a:prstGeom prst="rect">
@@ -4693,12 +4679,12 @@
               </p:cNvPicPr>
               <p:nvPr>
                 <p:custDataLst>
-                  <p:tags r:id="rId3"/>
+                  <p:tags r:id="rId4"/>
                 </p:custDataLst>
               </p:nvPr>
             </p:nvPicPr>
             <p:blipFill>
-              <a:blip r:embed="rId16" cstate="print">
+              <a:blip r:embed="rId17" cstate="print">
                 <a:extLst>
                   <a:ext uri="{28A0092B-C50C-407E-A947-70E740481C1C}">
                     <a14:useLocalDpi xmlns:a14="http://schemas.microsoft.com/office/drawing/2010/main" val="0"/>
@@ -4727,12 +4713,12 @@
               </p:cNvPicPr>
               <p:nvPr>
                 <p:custDataLst>
-                  <p:tags r:id="rId4"/>
+                  <p:tags r:id="rId5"/>
                 </p:custDataLst>
               </p:nvPr>
             </p:nvPicPr>
             <p:blipFill>
-              <a:blip r:embed="rId17" cstate="print">
+              <a:blip r:embed="rId18" cstate="print">
                 <a:extLst>
                   <a:ext uri="{28A0092B-C50C-407E-A947-70E740481C1C}">
                     <a14:useLocalDpi xmlns:a14="http://schemas.microsoft.com/office/drawing/2010/main" val="0"/>
@@ -5098,12 +5084,12 @@
               </p:cNvPicPr>
               <p:nvPr>
                 <p:custDataLst>
-                  <p:tags r:id="rId5"/>
+                  <p:tags r:id="rId6"/>
                 </p:custDataLst>
               </p:nvPr>
             </p:nvPicPr>
             <p:blipFill>
-              <a:blip r:embed="rId19" cstate="print">
+              <a:blip r:embed="rId20" cstate="print">
                 <a:extLst>
                   <a:ext uri="{28A0092B-C50C-407E-A947-70E740481C1C}">
                     <a14:useLocalDpi xmlns:a14="http://schemas.microsoft.com/office/drawing/2010/main" val="0"/>
@@ -5168,12 +5154,12 @@
               </p:cNvPicPr>
               <p:nvPr>
                 <p:custDataLst>
-                  <p:tags r:id="rId6"/>
+                  <p:tags r:id="rId7"/>
                 </p:custDataLst>
               </p:nvPr>
             </p:nvPicPr>
             <p:blipFill>
-              <a:blip r:embed="rId14" cstate="print">
+              <a:blip r:embed="rId15" cstate="print">
                 <a:extLst>
                   <a:ext uri="{28A0092B-C50C-407E-A947-70E740481C1C}">
                     <a14:useLocalDpi xmlns:a14="http://schemas.microsoft.com/office/drawing/2010/main" val="0"/>
@@ -5202,12 +5188,12 @@
               </p:cNvPicPr>
               <p:nvPr>
                 <p:custDataLst>
-                  <p:tags r:id="rId7"/>
+                  <p:tags r:id="rId8"/>
                 </p:custDataLst>
               </p:nvPr>
             </p:nvPicPr>
             <p:blipFill>
-              <a:blip r:embed="rId20" cstate="print">
+              <a:blip r:embed="rId21" cstate="print">
                 <a:extLst>
                   <a:ext uri="{28A0092B-C50C-407E-A947-70E740481C1C}">
                     <a14:useLocalDpi xmlns:a14="http://schemas.microsoft.com/office/drawing/2010/main" val="0"/>
@@ -5237,12 +5223,12 @@
             </p:cNvPicPr>
             <p:nvPr>
               <p:custDataLst>
-                <p:tags r:id="rId1"/>
+                <p:tags r:id="rId2"/>
               </p:custDataLst>
             </p:nvPr>
           </p:nvPicPr>
           <p:blipFill>
-            <a:blip r:embed="rId21" cstate="print">
+            <a:blip r:embed="rId22" cstate="print">
               <a:extLst>
                 <a:ext uri="{28A0092B-C50C-407E-A947-70E740481C1C}">
                   <a14:useLocalDpi xmlns:a14="http://schemas.microsoft.com/office/drawing/2010/main" val="0"/>
@@ -5271,12 +5257,12 @@
             </p:cNvPicPr>
             <p:nvPr>
               <p:custDataLst>
-                <p:tags r:id="rId2"/>
+                <p:tags r:id="rId3"/>
               </p:custDataLst>
             </p:nvPr>
           </p:nvPicPr>
           <p:blipFill>
-            <a:blip r:embed="rId22" cstate="print">
+            <a:blip r:embed="rId23" cstate="print">
               <a:extLst>
                 <a:ext uri="{28A0092B-C50C-407E-A947-70E740481C1C}">
                   <a14:useLocalDpi xmlns:a14="http://schemas.microsoft.com/office/drawing/2010/main" val="0"/>
@@ -5930,12 +5916,19 @@
 
 <file path=ppt/tags/tag1.xml><?xml version="1.0" encoding="utf-8"?>
 <p:tagLst xmlns:a="http://schemas.openxmlformats.org/drawingml/2006/main" xmlns:r="http://schemas.openxmlformats.org/officeDocument/2006/relationships" xmlns:p="http://schemas.openxmlformats.org/presentationml/2006/main">
-  <p:tag name="ORIGINALHEIGHT" val="74.99063"/>
-  <p:tag name="ORIGINALWIDTH" val="105.7368"/>
+  <p:tag name="SELECTIONNAME" val="Group 13"/>
+  <p:tag name="LAYER" val="2"/>
+</p:tagLst>
+</file>
+
+<file path=ppt/tags/tag10.xml><?xml version="1.0" encoding="utf-8"?>
+<p:tagLst xmlns:a="http://schemas.openxmlformats.org/drawingml/2006/main" xmlns:r="http://schemas.openxmlformats.org/officeDocument/2006/relationships" xmlns:p="http://schemas.openxmlformats.org/presentationml/2006/main">
+  <p:tag name="ORIGINALHEIGHT" val="123.7346"/>
+  <p:tag name="ORIGINALWIDTH" val="216.7229"/>
   <p:tag name="OUTPUTDPI" val="1200"/>
-  <p:tag name="LATEXADDIN" val="\documentclass{article}&#10;\usepackage{amsmath}&#10;\pagestyle{empty}&#10;\begin{document}&#10;&#10;$\mathbf{r}_\text{d}$&#10;&#10;&#10;\end{document}"/>
+  <p:tag name="LATEXADDIN" val="\documentclass{article}&#10;\usepackage{amsmath}&#10;\pagestyle{empty}&#10;\begin{document}&#10;&#10;$r(n)$&#10;&#10;&#10;\end{document}"/>
   <p:tag name="IGUANATEXSIZE" val="20"/>
-  <p:tag name="IGUANATEXCURSOR" val="101"/>
+  <p:tag name="IGUANATEXCURSOR" val="83"/>
   <p:tag name="TRANSPARENCY" val="True"/>
   <p:tag name="FILENAME" val=""/>
   <p:tag name="INPUTTYPE" val="0"/>
@@ -5944,7 +5937,7 @@
 </p:tagLst>
 </file>
 
-<file path=ppt/tags/tag10.xml><?xml version="1.0" encoding="utf-8"?>
+<file path=ppt/tags/tag11.xml><?xml version="1.0" encoding="utf-8"?>
 <p:tagLst xmlns:a="http://schemas.openxmlformats.org/drawingml/2006/main" xmlns:r="http://schemas.openxmlformats.org/officeDocument/2006/relationships" xmlns:p="http://schemas.openxmlformats.org/presentationml/2006/main">
   <p:tag name="ORIGINALHEIGHT" val="119.2351"/>
   <p:tag name="ORIGINALWIDTH" val="71.99102"/>
@@ -5960,7 +5953,7 @@
 </p:tagLst>
 </file>
 
-<file path=ppt/tags/tag11.xml><?xml version="1.0" encoding="utf-8"?>
+<file path=ppt/tags/tag12.xml><?xml version="1.0" encoding="utf-8"?>
 <p:tagLst xmlns:a="http://schemas.openxmlformats.org/drawingml/2006/main" xmlns:r="http://schemas.openxmlformats.org/officeDocument/2006/relationships" xmlns:p="http://schemas.openxmlformats.org/presentationml/2006/main">
   <p:tag name="ORIGINALHEIGHT" val="134.9832"/>
   <p:tag name="ORIGINALWIDTH" val="134.9832"/>
@@ -5976,7 +5969,7 @@
 </p:tagLst>
 </file>
 
-<file path=ppt/tags/tag12.xml><?xml version="1.0" encoding="utf-8"?>
+<file path=ppt/tags/tag13.xml><?xml version="1.0" encoding="utf-8"?>
 <p:tagLst xmlns:a="http://schemas.openxmlformats.org/drawingml/2006/main" xmlns:r="http://schemas.openxmlformats.org/officeDocument/2006/relationships" xmlns:p="http://schemas.openxmlformats.org/presentationml/2006/main">
   <p:tag name="ORIGINALHEIGHT" val="91.48859"/>
   <p:tag name="ORIGINALWIDTH" val="194.9756"/>
@@ -5992,7 +5985,7 @@
 </p:tagLst>
 </file>
 
-<file path=ppt/tags/tag13.xml><?xml version="1.0" encoding="utf-8"?>
+<file path=ppt/tags/tag14.xml><?xml version="1.0" encoding="utf-8"?>
 <p:tagLst xmlns:a="http://schemas.openxmlformats.org/drawingml/2006/main" xmlns:r="http://schemas.openxmlformats.org/officeDocument/2006/relationships" xmlns:p="http://schemas.openxmlformats.org/presentationml/2006/main">
   <p:tag name="ORIGINALHEIGHT" val="123.7346"/>
   <p:tag name="ORIGINALWIDTH" val="257.9677"/>
@@ -6008,7 +6001,7 @@
 </p:tagLst>
 </file>
 
-<file path=ppt/tags/tag14.xml><?xml version="1.0" encoding="utf-8"?>
+<file path=ppt/tags/tag15.xml><?xml version="1.0" encoding="utf-8"?>
 <p:tagLst xmlns:a="http://schemas.openxmlformats.org/drawingml/2006/main" xmlns:r="http://schemas.openxmlformats.org/officeDocument/2006/relationships" xmlns:p="http://schemas.openxmlformats.org/presentationml/2006/main">
   <p:tag name="ORIGINALHEIGHT" val="91.48859"/>
   <p:tag name="ORIGINALWIDTH" val="194.9756"/>
@@ -6026,6 +6019,22 @@
 
 <file path=ppt/tags/tag2.xml><?xml version="1.0" encoding="utf-8"?>
 <p:tagLst xmlns:a="http://schemas.openxmlformats.org/drawingml/2006/main" xmlns:r="http://schemas.openxmlformats.org/officeDocument/2006/relationships" xmlns:p="http://schemas.openxmlformats.org/presentationml/2006/main">
+  <p:tag name="ORIGINALHEIGHT" val="74.99063"/>
+  <p:tag name="ORIGINALWIDTH" val="105.7368"/>
+  <p:tag name="OUTPUTDPI" val="1200"/>
+  <p:tag name="LATEXADDIN" val="\documentclass{article}&#10;\usepackage{amsmath}&#10;\pagestyle{empty}&#10;\begin{document}&#10;&#10;$\mathbf{r}_\text{d}$&#10;&#10;&#10;\end{document}"/>
+  <p:tag name="IGUANATEXSIZE" val="20"/>
+  <p:tag name="IGUANATEXCURSOR" val="101"/>
+  <p:tag name="TRANSPARENCY" val="True"/>
+  <p:tag name="FILENAME" val=""/>
+  <p:tag name="INPUTTYPE" val="0"/>
+  <p:tag name="LATEXENGINEID" val="0"/>
+  <p:tag name="TEMPFOLDER" val="C:\Users\ecestudent\Documents\IguanaTexTemp\"/>
+</p:tagLst>
+</file>
+
+<file path=ppt/tags/tag3.xml><?xml version="1.0" encoding="utf-8"?>
+<p:tagLst xmlns:a="http://schemas.openxmlformats.org/drawingml/2006/main" xmlns:r="http://schemas.openxmlformats.org/officeDocument/2006/relationships" xmlns:p="http://schemas.openxmlformats.org/presentationml/2006/main">
   <p:tag name="ORIGINALHEIGHT" val="106.4867"/>
   <p:tag name="ORIGINALWIDTH" val="121.4848"/>
   <p:tag name="OUTPUTDPI" val="1200"/>
@@ -6040,7 +6049,7 @@
 </p:tagLst>
 </file>
 
-<file path=ppt/tags/tag3.xml><?xml version="1.0" encoding="utf-8"?>
+<file path=ppt/tags/tag4.xml><?xml version="1.0" encoding="utf-8"?>
 <p:tagLst xmlns:a="http://schemas.openxmlformats.org/drawingml/2006/main" xmlns:r="http://schemas.openxmlformats.org/officeDocument/2006/relationships" xmlns:p="http://schemas.openxmlformats.org/presentationml/2006/main">
   <p:tag name="ORIGINALHEIGHT" val="119.2351"/>
   <p:tag name="ORIGINALWIDTH" val="71.99102"/>
@@ -6056,7 +6065,7 @@
 </p:tagLst>
 </file>
 
-<file path=ppt/tags/tag4.xml><?xml version="1.0" encoding="utf-8"?>
+<file path=ppt/tags/tag5.xml><?xml version="1.0" encoding="utf-8"?>
 <p:tagLst xmlns:a="http://schemas.openxmlformats.org/drawingml/2006/main" xmlns:r="http://schemas.openxmlformats.org/officeDocument/2006/relationships" xmlns:p="http://schemas.openxmlformats.org/presentationml/2006/main">
   <p:tag name="ORIGINALHEIGHT" val="134.9832"/>
   <p:tag name="ORIGINALWIDTH" val="134.9832"/>
@@ -6072,7 +6081,7 @@
 </p:tagLst>
 </file>
 
-<file path=ppt/tags/tag5.xml><?xml version="1.0" encoding="utf-8"?>
+<file path=ppt/tags/tag6.xml><?xml version="1.0" encoding="utf-8"?>
 <p:tagLst xmlns:a="http://schemas.openxmlformats.org/drawingml/2006/main" xmlns:r="http://schemas.openxmlformats.org/officeDocument/2006/relationships" xmlns:p="http://schemas.openxmlformats.org/presentationml/2006/main">
   <p:tag name="ORIGINALHEIGHT" val="119.985"/>
   <p:tag name="ORIGINALWIDTH" val="70.49118"/>
@@ -6088,7 +6097,7 @@
 </p:tagLst>
 </file>
 
-<file path=ppt/tags/tag6.xml><?xml version="1.0" encoding="utf-8"?>
+<file path=ppt/tags/tag7.xml><?xml version="1.0" encoding="utf-8"?>
 <p:tagLst xmlns:a="http://schemas.openxmlformats.org/drawingml/2006/main" xmlns:r="http://schemas.openxmlformats.org/officeDocument/2006/relationships" xmlns:p="http://schemas.openxmlformats.org/presentationml/2006/main">
   <p:tag name="ORIGINALHEIGHT" val="56.24299"/>
   <p:tag name="ORIGINALWIDTH" val="50.99362"/>
@@ -6104,7 +6113,7 @@
 </p:tagLst>
 </file>
 
-<file path=ppt/tags/tag7.xml><?xml version="1.0" encoding="utf-8"?>
+<file path=ppt/tags/tag8.xml><?xml version="1.0" encoding="utf-8"?>
 <p:tagLst xmlns:a="http://schemas.openxmlformats.org/drawingml/2006/main" xmlns:r="http://schemas.openxmlformats.org/officeDocument/2006/relationships" xmlns:p="http://schemas.openxmlformats.org/presentationml/2006/main">
   <p:tag name="ORIGINALHEIGHT" val="56.99291"/>
   <p:tag name="ORIGINALWIDTH" val="55.49307"/>
@@ -6120,28 +6129,12 @@
 </p:tagLst>
 </file>
 
-<file path=ppt/tags/tag8.xml><?xml version="1.0" encoding="utf-8"?>
+<file path=ppt/tags/tag9.xml><?xml version="1.0" encoding="utf-8"?>
 <p:tagLst xmlns:a="http://schemas.openxmlformats.org/drawingml/2006/main" xmlns:r="http://schemas.openxmlformats.org/officeDocument/2006/relationships" xmlns:p="http://schemas.openxmlformats.org/presentationml/2006/main">
   <p:tag name="ORIGINALHEIGHT" val="56.24299"/>
   <p:tag name="ORIGINALWIDTH" val="50.99362"/>
   <p:tag name="OUTPUTDPI" val="1200"/>
   <p:tag name="LATEXADDIN" val="\documentclass{article}&#10;\usepackage{amsmath}&#10;\pagestyle{empty}&#10;\begin{document}&#10;&#10;$\mathbf{r}$&#10;&#10;&#10;\end{document}"/>
-  <p:tag name="IGUANATEXSIZE" val="20"/>
-  <p:tag name="IGUANATEXCURSOR" val="92"/>
-  <p:tag name="TRANSPARENCY" val="True"/>
-  <p:tag name="FILENAME" val=""/>
-  <p:tag name="INPUTTYPE" val="0"/>
-  <p:tag name="LATEXENGINEID" val="0"/>
-  <p:tag name="TEMPFOLDER" val="C:\Users\ecestudent\Documents\IguanaTexTemp\"/>
-</p:tagLst>
-</file>
-
-<file path=ppt/tags/tag9.xml><?xml version="1.0" encoding="utf-8"?>
-<p:tagLst xmlns:a="http://schemas.openxmlformats.org/drawingml/2006/main" xmlns:r="http://schemas.openxmlformats.org/officeDocument/2006/relationships" xmlns:p="http://schemas.openxmlformats.org/presentationml/2006/main">
-  <p:tag name="ORIGINALHEIGHT" val="123.7346"/>
-  <p:tag name="ORIGINALWIDTH" val="257.9677"/>
-  <p:tag name="OUTPUTDPI" val="1200"/>
-  <p:tag name="LATEXADDIN" val="\documentclass{article}&#10;\usepackage{amsmath}&#10;\pagestyle{empty}&#10;\begin{document}&#10;&#10;$r_\text{r}(n)$&#10;&#10;&#10;\end{document}"/>
   <p:tag name="IGUANATEXSIZE" val="20"/>
   <p:tag name="IGUANATEXCURSOR" val="92"/>
   <p:tag name="TRANSPARENCY" val="True"/>

</xml_diff>

<commit_message>
Put together a super rough draft For Dr Rice.  Starting to work on the GPU Intro section
</commit_message>
<xml_diff>
--- a/figures/systemOverview/systemOverview.pptx
+++ b/figures/systemOverview/systemOverview.pptx
@@ -6,7 +6,8 @@
   </p:sldMasterIdLst>
   <p:sldIdLst>
     <p:sldId id="257" r:id="rId2"/>
-    <p:sldId id="256" r:id="rId3"/>
+    <p:sldId id="258" r:id="rId3"/>
+    <p:sldId id="256" r:id="rId4"/>
   </p:sldIdLst>
   <p:sldSz cx="12192000" cy="6858000"/>
   <p:notesSz cx="6858000" cy="9144000"/>
@@ -281,7 +282,7 @@
           <a:p>
             <a:fld id="{61E06506-3CEE-4661-A7C6-5024C13C4392}" type="datetimeFigureOut">
               <a:rPr lang="en-US" smtClean="0"/>
-              <a:t>1/12/2017</a:t>
+              <a:t>2/28/2017</a:t>
             </a:fld>
             <a:endParaRPr lang="en-US"/>
           </a:p>
@@ -451,7 +452,7 @@
           <a:p>
             <a:fld id="{61E06506-3CEE-4661-A7C6-5024C13C4392}" type="datetimeFigureOut">
               <a:rPr lang="en-US" smtClean="0"/>
-              <a:t>1/12/2017</a:t>
+              <a:t>2/28/2017</a:t>
             </a:fld>
             <a:endParaRPr lang="en-US"/>
           </a:p>
@@ -631,7 +632,7 @@
           <a:p>
             <a:fld id="{61E06506-3CEE-4661-A7C6-5024C13C4392}" type="datetimeFigureOut">
               <a:rPr lang="en-US" smtClean="0"/>
-              <a:t>1/12/2017</a:t>
+              <a:t>2/28/2017</a:t>
             </a:fld>
             <a:endParaRPr lang="en-US"/>
           </a:p>
@@ -801,7 +802,7 @@
           <a:p>
             <a:fld id="{61E06506-3CEE-4661-A7C6-5024C13C4392}" type="datetimeFigureOut">
               <a:rPr lang="en-US" smtClean="0"/>
-              <a:t>1/12/2017</a:t>
+              <a:t>2/28/2017</a:t>
             </a:fld>
             <a:endParaRPr lang="en-US"/>
           </a:p>
@@ -1047,7 +1048,7 @@
           <a:p>
             <a:fld id="{61E06506-3CEE-4661-A7C6-5024C13C4392}" type="datetimeFigureOut">
               <a:rPr lang="en-US" smtClean="0"/>
-              <a:t>1/12/2017</a:t>
+              <a:t>2/28/2017</a:t>
             </a:fld>
             <a:endParaRPr lang="en-US"/>
           </a:p>
@@ -1279,7 +1280,7 @@
           <a:p>
             <a:fld id="{61E06506-3CEE-4661-A7C6-5024C13C4392}" type="datetimeFigureOut">
               <a:rPr lang="en-US" smtClean="0"/>
-              <a:t>1/12/2017</a:t>
+              <a:t>2/28/2017</a:t>
             </a:fld>
             <a:endParaRPr lang="en-US"/>
           </a:p>
@@ -1646,7 +1647,7 @@
           <a:p>
             <a:fld id="{61E06506-3CEE-4661-A7C6-5024C13C4392}" type="datetimeFigureOut">
               <a:rPr lang="en-US" smtClean="0"/>
-              <a:t>1/12/2017</a:t>
+              <a:t>2/28/2017</a:t>
             </a:fld>
             <a:endParaRPr lang="en-US"/>
           </a:p>
@@ -1764,7 +1765,7 @@
           <a:p>
             <a:fld id="{61E06506-3CEE-4661-A7C6-5024C13C4392}" type="datetimeFigureOut">
               <a:rPr lang="en-US" smtClean="0"/>
-              <a:t>1/12/2017</a:t>
+              <a:t>2/28/2017</a:t>
             </a:fld>
             <a:endParaRPr lang="en-US"/>
           </a:p>
@@ -1859,7 +1860,7 @@
           <a:p>
             <a:fld id="{61E06506-3CEE-4661-A7C6-5024C13C4392}" type="datetimeFigureOut">
               <a:rPr lang="en-US" smtClean="0"/>
-              <a:t>1/12/2017</a:t>
+              <a:t>2/28/2017</a:t>
             </a:fld>
             <a:endParaRPr lang="en-US"/>
           </a:p>
@@ -2136,7 +2137,7 @@
           <a:p>
             <a:fld id="{61E06506-3CEE-4661-A7C6-5024C13C4392}" type="datetimeFigureOut">
               <a:rPr lang="en-US" smtClean="0"/>
-              <a:t>1/12/2017</a:t>
+              <a:t>2/28/2017</a:t>
             </a:fld>
             <a:endParaRPr lang="en-US"/>
           </a:p>
@@ -2389,7 +2390,7 @@
           <a:p>
             <a:fld id="{61E06506-3CEE-4661-A7C6-5024C13C4392}" type="datetimeFigureOut">
               <a:rPr lang="en-US" smtClean="0"/>
-              <a:t>1/12/2017</a:t>
+              <a:t>2/28/2017</a:t>
             </a:fld>
             <a:endParaRPr lang="en-US"/>
           </a:p>
@@ -2602,7 +2603,7 @@
           <a:p>
             <a:fld id="{61E06506-3CEE-4661-A7C6-5024C13C4392}" type="datetimeFigureOut">
               <a:rPr lang="en-US" smtClean="0"/>
-              <a:t>1/12/2017</a:t>
+              <a:t>2/28/2017</a:t>
             </a:fld>
             <a:endParaRPr lang="en-US"/>
           </a:p>
@@ -5399,6 +5400,1142 @@
 </file>
 
 <file path=ppt/slides/slide2.xml><?xml version="1.0" encoding="utf-8"?>
+<p:sld xmlns:a="http://schemas.openxmlformats.org/drawingml/2006/main" xmlns:r="http://schemas.openxmlformats.org/officeDocument/2006/relationships" xmlns:p="http://schemas.openxmlformats.org/presentationml/2006/main">
+  <p:cSld>
+    <p:spTree>
+      <p:nvGrpSpPr>
+        <p:cNvPr id="1" name=""/>
+        <p:cNvGrpSpPr/>
+        <p:nvPr/>
+      </p:nvGrpSpPr>
+      <p:grpSpPr>
+        <a:xfrm>
+          <a:off x="0" y="0"/>
+          <a:ext cx="0" cy="0"/>
+          <a:chOff x="0" y="0"/>
+          <a:chExt cx="0" cy="0"/>
+        </a:xfrm>
+      </p:grpSpPr>
+      <p:grpSp>
+        <p:nvGrpSpPr>
+          <p:cNvPr id="233" name="Group 232"/>
+          <p:cNvGrpSpPr/>
+          <p:nvPr/>
+        </p:nvGrpSpPr>
+        <p:grpSpPr>
+          <a:xfrm>
+            <a:off x="1955044" y="803894"/>
+            <a:ext cx="8281912" cy="5250213"/>
+            <a:chOff x="2043019" y="817909"/>
+            <a:chExt cx="8281912" cy="5250213"/>
+          </a:xfrm>
+        </p:grpSpPr>
+        <p:pic>
+          <p:nvPicPr>
+            <p:cNvPr id="221" name="Picture 220"/>
+            <p:cNvPicPr>
+              <a:picLocks noChangeAspect="1"/>
+            </p:cNvPicPr>
+            <p:nvPr>
+              <p:custDataLst>
+                <p:tags r:id="rId1"/>
+              </p:custDataLst>
+            </p:nvPr>
+          </p:nvPicPr>
+          <p:blipFill>
+            <a:blip r:embed="rId10" cstate="print">
+              <a:extLst>
+                <a:ext uri="{28A0092B-C50C-407E-A947-70E740481C1C}">
+                  <a14:useLocalDpi xmlns:a14="http://schemas.microsoft.com/office/drawing/2010/main" val="0"/>
+                </a:ext>
+              </a:extLst>
+            </a:blip>
+            <a:stretch>
+              <a:fillRect/>
+            </a:stretch>
+          </p:blipFill>
+          <p:spPr>
+            <a:xfrm>
+              <a:off x="3219410" y="4040190"/>
+              <a:ext cx="5929130" cy="1063620"/>
+            </a:xfrm>
+            <a:prstGeom prst="rect">
+              <a:avLst/>
+            </a:prstGeom>
+          </p:spPr>
+        </p:pic>
+        <p:pic>
+          <p:nvPicPr>
+            <p:cNvPr id="222" name="Picture 221"/>
+            <p:cNvPicPr>
+              <a:picLocks noChangeAspect="1"/>
+            </p:cNvPicPr>
+            <p:nvPr>
+              <p:custDataLst>
+                <p:tags r:id="rId2"/>
+              </p:custDataLst>
+            </p:nvPr>
+          </p:nvPicPr>
+          <p:blipFill>
+            <a:blip r:embed="rId11" cstate="print">
+              <a:extLst>
+                <a:ext uri="{28A0092B-C50C-407E-A947-70E740481C1C}">
+                  <a14:useLocalDpi xmlns:a14="http://schemas.microsoft.com/office/drawing/2010/main" val="0"/>
+                </a:ext>
+              </a:extLst>
+            </a:blip>
+            <a:stretch>
+              <a:fillRect/>
+            </a:stretch>
+          </p:blipFill>
+          <p:spPr>
+            <a:xfrm>
+              <a:off x="3193506" y="5309264"/>
+              <a:ext cx="5980939" cy="758858"/>
+            </a:xfrm>
+            <a:prstGeom prst="rect">
+              <a:avLst/>
+            </a:prstGeom>
+          </p:spPr>
+        </p:pic>
+        <p:sp>
+          <p:nvSpPr>
+            <p:cNvPr id="137" name="Flowchart: Summing Junction 136"/>
+            <p:cNvSpPr/>
+            <p:nvPr/>
+          </p:nvSpPr>
+          <p:spPr>
+            <a:xfrm>
+              <a:off x="3338455" y="1122709"/>
+              <a:ext cx="533400" cy="533400"/>
+            </a:xfrm>
+            <a:prstGeom prst="flowChartSummingJunction">
+              <a:avLst/>
+            </a:prstGeom>
+            <a:solidFill>
+              <a:schemeClr val="bg1">
+                <a:lumMod val="95000"/>
+              </a:schemeClr>
+            </a:solidFill>
+            <a:ln>
+              <a:solidFill>
+                <a:schemeClr val="tx1"/>
+              </a:solidFill>
+            </a:ln>
+          </p:spPr>
+          <p:style>
+            <a:lnRef idx="2">
+              <a:schemeClr val="accent1">
+                <a:shade val="50000"/>
+              </a:schemeClr>
+            </a:lnRef>
+            <a:fillRef idx="1">
+              <a:schemeClr val="accent1"/>
+            </a:fillRef>
+            <a:effectRef idx="0">
+              <a:schemeClr val="accent1"/>
+            </a:effectRef>
+            <a:fontRef idx="minor">
+              <a:schemeClr val="lt1"/>
+            </a:fontRef>
+          </p:style>
+          <p:txBody>
+            <a:bodyPr rtlCol="0" anchor="ctr"/>
+            <a:lstStyle/>
+            <a:p>
+              <a:pPr algn="ctr"/>
+              <a:endParaRPr lang="en-US">
+                <a:latin typeface="Times New Roman" panose="02020603050405020304" pitchFamily="18" charset="0"/>
+                <a:cs typeface="Times New Roman" panose="02020603050405020304" pitchFamily="18" charset="0"/>
+              </a:endParaRPr>
+            </a:p>
+          </p:txBody>
+        </p:sp>
+        <p:grpSp>
+          <p:nvGrpSpPr>
+            <p:cNvPr id="154" name="Group 153"/>
+            <p:cNvGrpSpPr/>
+            <p:nvPr/>
+          </p:nvGrpSpPr>
+          <p:grpSpPr>
+            <a:xfrm>
+              <a:off x="7979288" y="817909"/>
+              <a:ext cx="1143000" cy="1143000"/>
+              <a:chOff x="7613821" y="1710192"/>
+              <a:chExt cx="1143000" cy="1143000"/>
+            </a:xfrm>
+          </p:grpSpPr>
+          <p:sp>
+            <p:nvSpPr>
+              <p:cNvPr id="152" name="Rectangle 151"/>
+              <p:cNvSpPr/>
+              <p:nvPr/>
+            </p:nvSpPr>
+            <p:spPr>
+              <a:xfrm>
+                <a:off x="7613821" y="1710192"/>
+                <a:ext cx="1143000" cy="1143000"/>
+              </a:xfrm>
+              <a:prstGeom prst="rect">
+                <a:avLst/>
+              </a:prstGeom>
+              <a:solidFill>
+                <a:schemeClr val="bg1">
+                  <a:lumMod val="95000"/>
+                </a:schemeClr>
+              </a:solidFill>
+              <a:ln>
+                <a:solidFill>
+                  <a:schemeClr val="tx1"/>
+                </a:solidFill>
+              </a:ln>
+            </p:spPr>
+            <p:style>
+              <a:lnRef idx="2">
+                <a:schemeClr val="accent1">
+                  <a:shade val="50000"/>
+                </a:schemeClr>
+              </a:lnRef>
+              <a:fillRef idx="1">
+                <a:schemeClr val="accent1"/>
+              </a:fillRef>
+              <a:effectRef idx="0">
+                <a:schemeClr val="accent1"/>
+              </a:effectRef>
+              <a:fontRef idx="minor">
+                <a:schemeClr val="lt1"/>
+              </a:fontRef>
+            </p:style>
+            <p:txBody>
+              <a:bodyPr rtlCol="0" anchor="ctr"/>
+              <a:lstStyle/>
+              <a:p>
+                <a:pPr algn="ctr"/>
+                <a:endParaRPr lang="en-US" dirty="0">
+                  <a:latin typeface="Times New Roman" panose="02020603050405020304" pitchFamily="18" charset="0"/>
+                  <a:cs typeface="Times New Roman" panose="02020603050405020304" pitchFamily="18" charset="0"/>
+                </a:endParaRPr>
+              </a:p>
+            </p:txBody>
+          </p:sp>
+          <p:cxnSp>
+            <p:nvCxnSpPr>
+              <p:cNvPr id="145" name="Straight Connector 144"/>
+              <p:cNvCxnSpPr/>
+              <p:nvPr/>
+            </p:nvCxnSpPr>
+            <p:spPr>
+              <a:xfrm>
+                <a:off x="7848364" y="2288035"/>
+                <a:ext cx="673915" cy="1"/>
+              </a:xfrm>
+              <a:prstGeom prst="line">
+                <a:avLst/>
+              </a:prstGeom>
+              <a:ln w="9525">
+                <a:solidFill>
+                  <a:schemeClr val="tx1"/>
+                </a:solidFill>
+              </a:ln>
+            </p:spPr>
+            <p:style>
+              <a:lnRef idx="1">
+                <a:schemeClr val="accent1"/>
+              </a:lnRef>
+              <a:fillRef idx="0">
+                <a:schemeClr val="accent1"/>
+              </a:fillRef>
+              <a:effectRef idx="0">
+                <a:schemeClr val="accent1"/>
+              </a:effectRef>
+              <a:fontRef idx="minor">
+                <a:schemeClr val="tx1"/>
+              </a:fontRef>
+            </p:style>
+          </p:cxnSp>
+          <p:cxnSp>
+            <p:nvCxnSpPr>
+              <p:cNvPr id="146" name="Straight Connector 145"/>
+              <p:cNvCxnSpPr/>
+              <p:nvPr/>
+            </p:nvCxnSpPr>
+            <p:spPr>
+              <a:xfrm rot="10800000" flipH="1">
+                <a:off x="8185321" y="2056345"/>
+                <a:ext cx="310196" cy="0"/>
+              </a:xfrm>
+              <a:prstGeom prst="line">
+                <a:avLst/>
+              </a:prstGeom>
+              <a:ln w="19050">
+                <a:solidFill>
+                  <a:schemeClr val="tx1"/>
+                </a:solidFill>
+              </a:ln>
+            </p:spPr>
+            <p:style>
+              <a:lnRef idx="1">
+                <a:schemeClr val="accent1"/>
+              </a:lnRef>
+              <a:fillRef idx="0">
+                <a:schemeClr val="accent1"/>
+              </a:fillRef>
+              <a:effectRef idx="0">
+                <a:schemeClr val="accent1"/>
+              </a:effectRef>
+              <a:fontRef idx="minor">
+                <a:schemeClr val="tx1"/>
+              </a:fontRef>
+            </p:style>
+          </p:cxnSp>
+          <p:cxnSp>
+            <p:nvCxnSpPr>
+              <p:cNvPr id="147" name="Straight Connector 146"/>
+              <p:cNvCxnSpPr/>
+              <p:nvPr/>
+            </p:nvCxnSpPr>
+            <p:spPr>
+              <a:xfrm>
+                <a:off x="8185321" y="2049949"/>
+                <a:ext cx="0" cy="463595"/>
+              </a:xfrm>
+              <a:prstGeom prst="line">
+                <a:avLst/>
+              </a:prstGeom>
+              <a:ln w="19050">
+                <a:solidFill>
+                  <a:schemeClr val="tx1"/>
+                </a:solidFill>
+              </a:ln>
+            </p:spPr>
+            <p:style>
+              <a:lnRef idx="1">
+                <a:schemeClr val="accent1"/>
+              </a:lnRef>
+              <a:fillRef idx="0">
+                <a:schemeClr val="accent1"/>
+              </a:fillRef>
+              <a:effectRef idx="0">
+                <a:schemeClr val="accent1"/>
+              </a:effectRef>
+              <a:fontRef idx="minor">
+                <a:schemeClr val="tx1"/>
+              </a:fontRef>
+            </p:style>
+          </p:cxnSp>
+          <p:cxnSp>
+            <p:nvCxnSpPr>
+              <p:cNvPr id="149" name="Straight Connector 148"/>
+              <p:cNvCxnSpPr/>
+              <p:nvPr/>
+            </p:nvCxnSpPr>
+            <p:spPr>
+              <a:xfrm flipH="1">
+                <a:off x="7878399" y="2507040"/>
+                <a:ext cx="310196" cy="0"/>
+              </a:xfrm>
+              <a:prstGeom prst="line">
+                <a:avLst/>
+              </a:prstGeom>
+              <a:ln w="19050">
+                <a:solidFill>
+                  <a:schemeClr val="tx1"/>
+                </a:solidFill>
+              </a:ln>
+            </p:spPr>
+            <p:style>
+              <a:lnRef idx="1">
+                <a:schemeClr val="accent1"/>
+              </a:lnRef>
+              <a:fillRef idx="0">
+                <a:schemeClr val="accent1"/>
+              </a:fillRef>
+              <a:effectRef idx="0">
+                <a:schemeClr val="accent1"/>
+              </a:effectRef>
+              <a:fontRef idx="minor">
+                <a:schemeClr val="tx1"/>
+              </a:fontRef>
+            </p:style>
+          </p:cxnSp>
+          <p:cxnSp>
+            <p:nvCxnSpPr>
+              <p:cNvPr id="150" name="Straight Connector 149"/>
+              <p:cNvCxnSpPr/>
+              <p:nvPr/>
+            </p:nvCxnSpPr>
+            <p:spPr>
+              <a:xfrm rot="10800000">
+                <a:off x="8188595" y="2049841"/>
+                <a:ext cx="0" cy="463595"/>
+              </a:xfrm>
+              <a:prstGeom prst="line">
+                <a:avLst/>
+              </a:prstGeom>
+              <a:ln w="19050">
+                <a:solidFill>
+                  <a:schemeClr val="tx1"/>
+                </a:solidFill>
+              </a:ln>
+            </p:spPr>
+            <p:style>
+              <a:lnRef idx="1">
+                <a:schemeClr val="accent1"/>
+              </a:lnRef>
+              <a:fillRef idx="0">
+                <a:schemeClr val="accent1"/>
+              </a:fillRef>
+              <a:effectRef idx="0">
+                <a:schemeClr val="accent1"/>
+              </a:effectRef>
+              <a:fontRef idx="minor">
+                <a:schemeClr val="tx1"/>
+              </a:fontRef>
+            </p:style>
+          </p:cxnSp>
+        </p:grpSp>
+        <p:sp>
+          <p:nvSpPr>
+            <p:cNvPr id="155" name="Rectangle 154"/>
+            <p:cNvSpPr/>
+            <p:nvPr/>
+          </p:nvSpPr>
+          <p:spPr>
+            <a:xfrm>
+              <a:off x="6858000" y="2667000"/>
+              <a:ext cx="1143000" cy="1143000"/>
+            </a:xfrm>
+            <a:prstGeom prst="rect">
+              <a:avLst/>
+            </a:prstGeom>
+            <a:solidFill>
+              <a:schemeClr val="bg1">
+                <a:lumMod val="95000"/>
+              </a:schemeClr>
+            </a:solidFill>
+            <a:ln>
+              <a:solidFill>
+                <a:schemeClr val="tx1"/>
+              </a:solidFill>
+            </a:ln>
+          </p:spPr>
+          <p:style>
+            <a:lnRef idx="2">
+              <a:schemeClr val="accent1">
+                <a:shade val="50000"/>
+              </a:schemeClr>
+            </a:lnRef>
+            <a:fillRef idx="1">
+              <a:schemeClr val="accent1"/>
+            </a:fillRef>
+            <a:effectRef idx="0">
+              <a:schemeClr val="accent1"/>
+            </a:effectRef>
+            <a:fontRef idx="minor">
+              <a:schemeClr val="lt1"/>
+            </a:fontRef>
+          </p:style>
+          <p:txBody>
+            <a:bodyPr rtlCol="0" anchor="ctr"/>
+            <a:lstStyle/>
+            <a:p>
+              <a:pPr algn="ctr"/>
+              <a:r>
+                <a:rPr lang="en-US" dirty="0" smtClean="0">
+                  <a:ln w="0"/>
+                  <a:solidFill>
+                    <a:schemeClr val="tx1"/>
+                  </a:solidFill>
+                  <a:effectLst>
+                    <a:outerShdw blurRad="38100" dist="19050" dir="2700000" algn="tl" rotWithShape="0">
+                      <a:schemeClr val="dk1">
+                        <a:alpha val="40000"/>
+                      </a:schemeClr>
+                    </a:outerShdw>
+                  </a:effectLst>
+                  <a:latin typeface="Times New Roman" panose="02020603050405020304" pitchFamily="18" charset="0"/>
+                  <a:cs typeface="Times New Roman" panose="02020603050405020304" pitchFamily="18" charset="0"/>
+                </a:rPr>
+                <a:t>PED</a:t>
+              </a:r>
+              <a:endParaRPr lang="en-US" dirty="0">
+                <a:latin typeface="Times New Roman" panose="02020603050405020304" pitchFamily="18" charset="0"/>
+                <a:cs typeface="Times New Roman" panose="02020603050405020304" pitchFamily="18" charset="0"/>
+              </a:endParaRPr>
+            </a:p>
+          </p:txBody>
+        </p:sp>
+        <p:grpSp>
+          <p:nvGrpSpPr>
+            <p:cNvPr id="164" name="Group 163"/>
+            <p:cNvGrpSpPr/>
+            <p:nvPr/>
+          </p:nvGrpSpPr>
+          <p:grpSpPr>
+            <a:xfrm>
+              <a:off x="5638800" y="2923032"/>
+              <a:ext cx="630936" cy="630936"/>
+              <a:chOff x="11212495" y="4304056"/>
+              <a:chExt cx="630936" cy="630936"/>
+            </a:xfrm>
+          </p:grpSpPr>
+          <p:sp>
+            <p:nvSpPr>
+              <p:cNvPr id="156" name="Isosceles Triangle 155"/>
+              <p:cNvSpPr/>
+              <p:nvPr/>
+            </p:nvSpPr>
+            <p:spPr>
+              <a:xfrm rot="16200000">
+                <a:off x="11212495" y="4304056"/>
+                <a:ext cx="630936" cy="630936"/>
+              </a:xfrm>
+              <a:prstGeom prst="triangle">
+                <a:avLst/>
+              </a:prstGeom>
+              <a:solidFill>
+                <a:schemeClr val="bg1">
+                  <a:lumMod val="95000"/>
+                </a:schemeClr>
+              </a:solidFill>
+              <a:ln>
+                <a:solidFill>
+                  <a:schemeClr val="tx1"/>
+                </a:solidFill>
+              </a:ln>
+            </p:spPr>
+            <p:style>
+              <a:lnRef idx="2">
+                <a:schemeClr val="accent1">
+                  <a:shade val="50000"/>
+                </a:schemeClr>
+              </a:lnRef>
+              <a:fillRef idx="1">
+                <a:schemeClr val="accent1"/>
+              </a:fillRef>
+              <a:effectRef idx="0">
+                <a:schemeClr val="accent1"/>
+              </a:effectRef>
+              <a:fontRef idx="minor">
+                <a:schemeClr val="lt1"/>
+              </a:fontRef>
+            </p:style>
+            <p:txBody>
+              <a:bodyPr rtlCol="0" anchor="ctr"/>
+              <a:lstStyle/>
+              <a:p>
+                <a:pPr algn="ctr"/>
+                <a:endParaRPr lang="en-US" dirty="0"/>
+              </a:p>
+            </p:txBody>
+          </p:sp>
+          <p:pic>
+            <p:nvPicPr>
+              <p:cNvPr id="157" name="Picture 156"/>
+              <p:cNvPicPr>
+                <a:picLocks noChangeAspect="1"/>
+              </p:cNvPicPr>
+              <p:nvPr>
+                <p:custDataLst>
+                  <p:tags r:id="rId8"/>
+                </p:custDataLst>
+              </p:nvPr>
+            </p:nvPicPr>
+            <p:blipFill>
+              <a:blip r:embed="rId12" cstate="print">
+                <a:extLst>
+                  <a:ext uri="{28A0092B-C50C-407E-A947-70E740481C1C}">
+                    <a14:useLocalDpi xmlns:a14="http://schemas.microsoft.com/office/drawing/2010/main" val="0"/>
+                  </a:ext>
+                </a:extLst>
+              </a:blip>
+              <a:stretch>
+                <a:fillRect/>
+              </a:stretch>
+            </p:blipFill>
+            <p:spPr>
+              <a:xfrm>
+                <a:off x="11510437" y="4517956"/>
+                <a:ext cx="279680" cy="203136"/>
+              </a:xfrm>
+              <a:prstGeom prst="rect">
+                <a:avLst/>
+              </a:prstGeom>
+              <a:noFill/>
+            </p:spPr>
+          </p:pic>
+        </p:grpSp>
+        <p:pic>
+          <p:nvPicPr>
+            <p:cNvPr id="178" name="Picture 177"/>
+            <p:cNvPicPr>
+              <a:picLocks noChangeAspect="1"/>
+            </p:cNvPicPr>
+            <p:nvPr>
+              <p:custDataLst>
+                <p:tags r:id="rId3"/>
+              </p:custDataLst>
+            </p:nvPr>
+          </p:nvPicPr>
+          <p:blipFill>
+            <a:blip r:embed="rId13" cstate="print">
+              <a:extLst>
+                <a:ext uri="{28A0092B-C50C-407E-A947-70E740481C1C}">
+                  <a14:useLocalDpi xmlns:a14="http://schemas.microsoft.com/office/drawing/2010/main" val="0"/>
+                </a:ext>
+              </a:extLst>
+            </a:blip>
+            <a:stretch>
+              <a:fillRect/>
+            </a:stretch>
+          </p:blipFill>
+          <p:spPr>
+            <a:xfrm>
+              <a:off x="2043019" y="1263695"/>
+              <a:ext cx="537904" cy="251429"/>
+            </a:xfrm>
+            <a:prstGeom prst="rect">
+              <a:avLst/>
+            </a:prstGeom>
+          </p:spPr>
+        </p:pic>
+        <p:sp>
+          <p:nvSpPr>
+            <p:cNvPr id="159" name="Rectangle 158"/>
+            <p:cNvSpPr/>
+            <p:nvPr/>
+          </p:nvSpPr>
+          <p:spPr>
+            <a:xfrm>
+              <a:off x="3949289" y="2667000"/>
+              <a:ext cx="1143000" cy="1143000"/>
+            </a:xfrm>
+            <a:prstGeom prst="rect">
+              <a:avLst/>
+            </a:prstGeom>
+            <a:solidFill>
+              <a:schemeClr val="bg1">
+                <a:lumMod val="95000"/>
+              </a:schemeClr>
+            </a:solidFill>
+            <a:ln>
+              <a:solidFill>
+                <a:schemeClr val="tx1"/>
+              </a:solidFill>
+            </a:ln>
+          </p:spPr>
+          <p:style>
+            <a:lnRef idx="2">
+              <a:schemeClr val="accent1">
+                <a:shade val="50000"/>
+              </a:schemeClr>
+            </a:lnRef>
+            <a:fillRef idx="1">
+              <a:schemeClr val="accent1"/>
+            </a:fillRef>
+            <a:effectRef idx="0">
+              <a:schemeClr val="accent1"/>
+            </a:effectRef>
+            <a:fontRef idx="minor">
+              <a:schemeClr val="lt1"/>
+            </a:fontRef>
+          </p:style>
+          <p:txBody>
+            <a:bodyPr rtlCol="0" anchor="ctr"/>
+            <a:lstStyle/>
+            <a:p>
+              <a:pPr algn="ctr"/>
+              <a:r>
+                <a:rPr lang="en-US" dirty="0" smtClean="0">
+                  <a:ln w="0"/>
+                  <a:solidFill>
+                    <a:schemeClr val="tx1"/>
+                  </a:solidFill>
+                  <a:effectLst>
+                    <a:outerShdw blurRad="38100" dist="19050" dir="2700000" algn="tl" rotWithShape="0">
+                      <a:schemeClr val="dk1">
+                        <a:alpha val="40000"/>
+                      </a:schemeClr>
+                    </a:outerShdw>
+                  </a:effectLst>
+                  <a:latin typeface="Times New Roman" panose="02020603050405020304" pitchFamily="18" charset="0"/>
+                  <a:cs typeface="Times New Roman" panose="02020603050405020304" pitchFamily="18" charset="0"/>
+                </a:rPr>
+                <a:t>DDS</a:t>
+              </a:r>
+              <a:endParaRPr lang="en-US" dirty="0">
+                <a:latin typeface="Times New Roman" panose="02020603050405020304" pitchFamily="18" charset="0"/>
+                <a:cs typeface="Times New Roman" panose="02020603050405020304" pitchFamily="18" charset="0"/>
+              </a:endParaRPr>
+            </a:p>
+          </p:txBody>
+        </p:sp>
+        <p:cxnSp>
+          <p:nvCxnSpPr>
+            <p:cNvPr id="160" name="Straight Arrow Connector 159"/>
+            <p:cNvCxnSpPr/>
+            <p:nvPr/>
+          </p:nvCxnSpPr>
+          <p:spPr>
+            <a:xfrm>
+              <a:off x="3871855" y="1389409"/>
+              <a:ext cx="4107433" cy="0"/>
+            </a:xfrm>
+            <a:prstGeom prst="straightConnector1">
+              <a:avLst/>
+            </a:prstGeom>
+            <a:ln w="12700" cmpd="sng">
+              <a:solidFill>
+                <a:schemeClr val="tx1"/>
+              </a:solidFill>
+              <a:tailEnd type="triangle"/>
+            </a:ln>
+            <a:effectLst/>
+          </p:spPr>
+          <p:style>
+            <a:lnRef idx="2">
+              <a:schemeClr val="accent1"/>
+            </a:lnRef>
+            <a:fillRef idx="0">
+              <a:schemeClr val="accent1"/>
+            </a:fillRef>
+            <a:effectRef idx="1">
+              <a:schemeClr val="accent1"/>
+            </a:effectRef>
+            <a:fontRef idx="minor">
+              <a:schemeClr val="tx1"/>
+            </a:fontRef>
+          </p:style>
+        </p:cxnSp>
+        <p:cxnSp>
+          <p:nvCxnSpPr>
+            <p:cNvPr id="161" name="Straight Arrow Connector 160"/>
+            <p:cNvCxnSpPr>
+              <a:endCxn id="155" idx="0"/>
+            </p:cNvCxnSpPr>
+            <p:nvPr/>
+          </p:nvCxnSpPr>
+          <p:spPr>
+            <a:xfrm>
+              <a:off x="7429500" y="1395752"/>
+              <a:ext cx="0" cy="1271248"/>
+            </a:xfrm>
+            <a:prstGeom prst="straightConnector1">
+              <a:avLst/>
+            </a:prstGeom>
+            <a:ln w="12700" cmpd="sng">
+              <a:solidFill>
+                <a:schemeClr val="tx1"/>
+              </a:solidFill>
+              <a:tailEnd type="triangle"/>
+            </a:ln>
+            <a:effectLst/>
+          </p:spPr>
+          <p:style>
+            <a:lnRef idx="2">
+              <a:schemeClr val="accent1"/>
+            </a:lnRef>
+            <a:fillRef idx="0">
+              <a:schemeClr val="accent1"/>
+            </a:fillRef>
+            <a:effectRef idx="1">
+              <a:schemeClr val="accent1"/>
+            </a:effectRef>
+            <a:fontRef idx="minor">
+              <a:schemeClr val="tx1"/>
+            </a:fontRef>
+          </p:style>
+        </p:cxnSp>
+        <p:cxnSp>
+          <p:nvCxnSpPr>
+            <p:cNvPr id="163" name="Straight Arrow Connector 162"/>
+            <p:cNvCxnSpPr>
+              <a:stCxn id="156" idx="3"/>
+              <a:endCxn id="155" idx="1"/>
+            </p:cNvCxnSpPr>
+            <p:nvPr/>
+          </p:nvCxnSpPr>
+          <p:spPr>
+            <a:xfrm>
+              <a:off x="6269736" y="3238500"/>
+              <a:ext cx="588264" cy="0"/>
+            </a:xfrm>
+            <a:prstGeom prst="straightConnector1">
+              <a:avLst/>
+            </a:prstGeom>
+            <a:ln w="12700">
+              <a:solidFill>
+                <a:schemeClr val="tx1"/>
+              </a:solidFill>
+              <a:headEnd type="triangle" w="med" len="med"/>
+              <a:tailEnd type="none" w="med" len="med"/>
+            </a:ln>
+          </p:spPr>
+          <p:style>
+            <a:lnRef idx="1">
+              <a:schemeClr val="accent1"/>
+            </a:lnRef>
+            <a:fillRef idx="0">
+              <a:schemeClr val="accent1"/>
+            </a:fillRef>
+            <a:effectRef idx="0">
+              <a:schemeClr val="accent1"/>
+            </a:effectRef>
+            <a:fontRef idx="minor">
+              <a:schemeClr val="tx1"/>
+            </a:fontRef>
+          </p:style>
+        </p:cxnSp>
+        <p:cxnSp>
+          <p:nvCxnSpPr>
+            <p:cNvPr id="165" name="Straight Arrow Connector 164"/>
+            <p:cNvCxnSpPr>
+              <a:stCxn id="159" idx="3"/>
+              <a:endCxn id="156" idx="0"/>
+            </p:cNvCxnSpPr>
+            <p:nvPr/>
+          </p:nvCxnSpPr>
+          <p:spPr>
+            <a:xfrm>
+              <a:off x="5092289" y="3238500"/>
+              <a:ext cx="546511" cy="0"/>
+            </a:xfrm>
+            <a:prstGeom prst="straightConnector1">
+              <a:avLst/>
+            </a:prstGeom>
+            <a:ln w="12700">
+              <a:solidFill>
+                <a:schemeClr val="tx1"/>
+              </a:solidFill>
+              <a:headEnd type="triangle" w="med" len="med"/>
+              <a:tailEnd type="none" w="med" len="med"/>
+            </a:ln>
+          </p:spPr>
+          <p:style>
+            <a:lnRef idx="1">
+              <a:schemeClr val="accent1"/>
+            </a:lnRef>
+            <a:fillRef idx="0">
+              <a:schemeClr val="accent1"/>
+            </a:fillRef>
+            <a:effectRef idx="0">
+              <a:schemeClr val="accent1"/>
+            </a:effectRef>
+            <a:fontRef idx="minor">
+              <a:schemeClr val="tx1"/>
+            </a:fontRef>
+          </p:style>
+        </p:cxnSp>
+        <p:cxnSp>
+          <p:nvCxnSpPr>
+            <p:cNvPr id="166" name="Straight Arrow Connector 165"/>
+            <p:cNvCxnSpPr/>
+            <p:nvPr/>
+          </p:nvCxnSpPr>
+          <p:spPr>
+            <a:xfrm>
+              <a:off x="2654132" y="1389409"/>
+              <a:ext cx="684323" cy="0"/>
+            </a:xfrm>
+            <a:prstGeom prst="straightConnector1">
+              <a:avLst/>
+            </a:prstGeom>
+            <a:ln w="12700">
+              <a:solidFill>
+                <a:schemeClr val="tx1"/>
+              </a:solidFill>
+              <a:tailEnd type="triangle"/>
+            </a:ln>
+          </p:spPr>
+          <p:style>
+            <a:lnRef idx="1">
+              <a:schemeClr val="accent1"/>
+            </a:lnRef>
+            <a:fillRef idx="0">
+              <a:schemeClr val="accent1"/>
+            </a:fillRef>
+            <a:effectRef idx="0">
+              <a:schemeClr val="accent1"/>
+            </a:effectRef>
+            <a:fontRef idx="minor">
+              <a:schemeClr val="tx1"/>
+            </a:fontRef>
+          </p:style>
+        </p:cxnSp>
+        <p:cxnSp>
+          <p:nvCxnSpPr>
+            <p:cNvPr id="167" name="Elbow Connector 166"/>
+            <p:cNvCxnSpPr>
+              <a:stCxn id="137" idx="4"/>
+              <a:endCxn id="159" idx="1"/>
+            </p:cNvCxnSpPr>
+            <p:nvPr/>
+          </p:nvCxnSpPr>
+          <p:spPr>
+            <a:xfrm rot="16200000" flipH="1">
+              <a:off x="2986027" y="2275237"/>
+              <a:ext cx="1582391" cy="344134"/>
+            </a:xfrm>
+            <a:prstGeom prst="bentConnector2">
+              <a:avLst/>
+            </a:prstGeom>
+            <a:ln w="12700">
+              <a:solidFill>
+                <a:schemeClr val="tx1"/>
+              </a:solidFill>
+              <a:headEnd type="triangle" w="med" len="med"/>
+              <a:tailEnd type="none" w="med" len="med"/>
+            </a:ln>
+          </p:spPr>
+          <p:style>
+            <a:lnRef idx="1">
+              <a:schemeClr val="accent1"/>
+            </a:lnRef>
+            <a:fillRef idx="0">
+              <a:schemeClr val="accent1"/>
+            </a:fillRef>
+            <a:effectRef idx="0">
+              <a:schemeClr val="accent1"/>
+            </a:effectRef>
+            <a:fontRef idx="minor">
+              <a:schemeClr val="tx1"/>
+            </a:fontRef>
+          </p:style>
+        </p:cxnSp>
+        <p:cxnSp>
+          <p:nvCxnSpPr>
+            <p:cNvPr id="172" name="Elbow Connector 171"/>
+            <p:cNvCxnSpPr>
+              <a:stCxn id="155" idx="3"/>
+              <a:endCxn id="152" idx="2"/>
+            </p:cNvCxnSpPr>
+            <p:nvPr/>
+          </p:nvCxnSpPr>
+          <p:spPr>
+            <a:xfrm flipV="1">
+              <a:off x="8001000" y="1960909"/>
+              <a:ext cx="549788" cy="1277591"/>
+            </a:xfrm>
+            <a:prstGeom prst="bentConnector2">
+              <a:avLst/>
+            </a:prstGeom>
+            <a:ln w="12700">
+              <a:solidFill>
+                <a:schemeClr val="tx1"/>
+              </a:solidFill>
+              <a:headEnd type="triangle" w="med" len="med"/>
+              <a:tailEnd type="none" w="med" len="med"/>
+            </a:ln>
+          </p:spPr>
+          <p:style>
+            <a:lnRef idx="1">
+              <a:schemeClr val="accent1"/>
+            </a:lnRef>
+            <a:fillRef idx="0">
+              <a:schemeClr val="accent1"/>
+            </a:fillRef>
+            <a:effectRef idx="0">
+              <a:schemeClr val="accent1"/>
+            </a:effectRef>
+            <a:fontRef idx="minor">
+              <a:schemeClr val="tx1"/>
+            </a:fontRef>
+          </p:style>
+        </p:cxnSp>
+        <p:pic>
+          <p:nvPicPr>
+            <p:cNvPr id="176" name="Picture 175"/>
+            <p:cNvPicPr>
+              <a:picLocks noChangeAspect="1"/>
+            </p:cNvPicPr>
+            <p:nvPr>
+              <p:custDataLst>
+                <p:tags r:id="rId4"/>
+              </p:custDataLst>
+            </p:nvPr>
+          </p:nvPicPr>
+          <p:blipFill>
+            <a:blip r:embed="rId14" cstate="print">
+              <a:extLst>
+                <a:ext uri="{28A0092B-C50C-407E-A947-70E740481C1C}">
+                  <a14:useLocalDpi xmlns:a14="http://schemas.microsoft.com/office/drawing/2010/main" val="0"/>
+                </a:ext>
+              </a:extLst>
+            </a:blip>
+            <a:stretch>
+              <a:fillRect/>
+            </a:stretch>
+          </p:blipFill>
+          <p:spPr>
+            <a:xfrm>
+              <a:off x="6372395" y="2894408"/>
+              <a:ext cx="419048" cy="251429"/>
+            </a:xfrm>
+            <a:prstGeom prst="rect">
+              <a:avLst/>
+            </a:prstGeom>
+          </p:spPr>
+        </p:pic>
+        <p:pic>
+          <p:nvPicPr>
+            <p:cNvPr id="180" name="Picture 179"/>
+            <p:cNvPicPr>
+              <a:picLocks noChangeAspect="1"/>
+            </p:cNvPicPr>
+            <p:nvPr>
+              <p:custDataLst>
+                <p:tags r:id="rId5"/>
+              </p:custDataLst>
+            </p:nvPr>
+          </p:nvPicPr>
+          <p:blipFill>
+            <a:blip r:embed="rId15" cstate="print">
+              <a:extLst>
+                <a:ext uri="{28A0092B-C50C-407E-A947-70E740481C1C}">
+                  <a14:useLocalDpi xmlns:a14="http://schemas.microsoft.com/office/drawing/2010/main" val="0"/>
+                </a:ext>
+              </a:extLst>
+            </a:blip>
+            <a:stretch>
+              <a:fillRect/>
+            </a:stretch>
+          </p:blipFill>
+          <p:spPr>
+            <a:xfrm>
+              <a:off x="4024369" y="1038347"/>
+              <a:ext cx="531809" cy="251429"/>
+            </a:xfrm>
+            <a:prstGeom prst="rect">
+              <a:avLst/>
+            </a:prstGeom>
+          </p:spPr>
+        </p:pic>
+        <p:pic>
+          <p:nvPicPr>
+            <p:cNvPr id="183" name="Picture 182"/>
+            <p:cNvPicPr>
+              <a:picLocks noChangeAspect="1"/>
+            </p:cNvPicPr>
+            <p:nvPr>
+              <p:custDataLst>
+                <p:tags r:id="rId6"/>
+              </p:custDataLst>
+            </p:nvPr>
+          </p:nvPicPr>
+          <p:blipFill>
+            <a:blip r:embed="rId16" cstate="print">
+              <a:extLst>
+                <a:ext uri="{28A0092B-C50C-407E-A947-70E740481C1C}">
+                  <a14:useLocalDpi xmlns:a14="http://schemas.microsoft.com/office/drawing/2010/main" val="0"/>
+                </a:ext>
+              </a:extLst>
+            </a:blip>
+            <a:stretch>
+              <a:fillRect/>
+            </a:stretch>
+          </p:blipFill>
+          <p:spPr>
+            <a:xfrm>
+              <a:off x="2907216" y="2736021"/>
+              <a:ext cx="621713" cy="265143"/>
+            </a:xfrm>
+            <a:prstGeom prst="rect">
+              <a:avLst/>
+            </a:prstGeom>
+          </p:spPr>
+        </p:pic>
+        <p:cxnSp>
+          <p:nvCxnSpPr>
+            <p:cNvPr id="189" name="Straight Arrow Connector 188"/>
+            <p:cNvCxnSpPr/>
+            <p:nvPr/>
+          </p:nvCxnSpPr>
+          <p:spPr>
+            <a:xfrm>
+              <a:off x="9122288" y="1389409"/>
+              <a:ext cx="684323" cy="0"/>
+            </a:xfrm>
+            <a:prstGeom prst="straightConnector1">
+              <a:avLst/>
+            </a:prstGeom>
+            <a:ln w="12700">
+              <a:solidFill>
+                <a:schemeClr val="tx1"/>
+              </a:solidFill>
+              <a:tailEnd type="triangle"/>
+            </a:ln>
+          </p:spPr>
+          <p:style>
+            <a:lnRef idx="1">
+              <a:schemeClr val="accent1"/>
+            </a:lnRef>
+            <a:fillRef idx="0">
+              <a:schemeClr val="accent1"/>
+            </a:fillRef>
+            <a:effectRef idx="0">
+              <a:schemeClr val="accent1"/>
+            </a:effectRef>
+            <a:fontRef idx="minor">
+              <a:schemeClr val="tx1"/>
+            </a:fontRef>
+          </p:style>
+        </p:cxnSp>
+        <p:pic>
+          <p:nvPicPr>
+            <p:cNvPr id="192" name="Picture 191"/>
+            <p:cNvPicPr>
+              <a:picLocks noChangeAspect="1"/>
+            </p:cNvPicPr>
+            <p:nvPr>
+              <p:custDataLst>
+                <p:tags r:id="rId7"/>
+              </p:custDataLst>
+            </p:nvPr>
+          </p:nvPicPr>
+          <p:blipFill>
+            <a:blip r:embed="rId17" cstate="print">
+              <a:extLst>
+                <a:ext uri="{28A0092B-C50C-407E-A947-70E740481C1C}">
+                  <a14:useLocalDpi xmlns:a14="http://schemas.microsoft.com/office/drawing/2010/main" val="0"/>
+                </a:ext>
+              </a:extLst>
+            </a:blip>
+            <a:stretch>
+              <a:fillRect/>
+            </a:stretch>
+          </p:blipFill>
+          <p:spPr>
+            <a:xfrm>
+              <a:off x="9889122" y="1263695"/>
+              <a:ext cx="435809" cy="251429"/>
+            </a:xfrm>
+            <a:prstGeom prst="rect">
+              <a:avLst/>
+            </a:prstGeom>
+          </p:spPr>
+        </p:pic>
+      </p:grpSp>
+    </p:spTree>
+    <p:extLst>
+      <p:ext uri="{BB962C8B-B14F-4D97-AF65-F5344CB8AC3E}">
+        <p14:creationId xmlns:p14="http://schemas.microsoft.com/office/powerpoint/2010/main" val="317871506"/>
+      </p:ext>
+    </p:extLst>
+  </p:cSld>
+  <p:clrMapOvr>
+    <a:masterClrMapping/>
+  </p:clrMapOvr>
+  <p:timing>
+    <p:tnLst>
+      <p:par>
+        <p:cTn id="1" dur="indefinite" restart="never" nodeType="tmRoot"/>
+      </p:par>
+    </p:tnLst>
+  </p:timing>
+</p:sld>
+</file>
+
+<file path=ppt/slides/slide3.xml><?xml version="1.0" encoding="utf-8"?>
 <p:sld xmlns:a="http://schemas.openxmlformats.org/drawingml/2006/main" xmlns:r="http://schemas.openxmlformats.org/officeDocument/2006/relationships" xmlns:p="http://schemas.openxmlformats.org/presentationml/2006/main">
   <p:cSld>
     <p:spTree>
@@ -5987,12 +7124,12 @@
 
 <file path=ppt/tags/tag14.xml><?xml version="1.0" encoding="utf-8"?>
 <p:tagLst xmlns:a="http://schemas.openxmlformats.org/drawingml/2006/main" xmlns:r="http://schemas.openxmlformats.org/officeDocument/2006/relationships" xmlns:p="http://schemas.openxmlformats.org/presentationml/2006/main">
-  <p:tag name="ORIGINALHEIGHT" val="123.7346"/>
-  <p:tag name="ORIGINALWIDTH" val="257.9677"/>
+  <p:tag name="ORIGINALHEIGHT" val="523.4346"/>
+  <p:tag name="ORIGINALWIDTH" val="2917.885"/>
   <p:tag name="OUTPUTDPI" val="1200"/>
-  <p:tag name="LATEXADDIN" val="\documentclass{article}&#10;\usepackage{amsmath}&#10;\pagestyle{empty}&#10;\begin{document}&#10;&#10;$r_\text{r}(n)$&#10;&#10;&#10;\end{document}"/>
+  <p:tag name="LATEXADDIN" val="\documentclass{article}&#10;\usepackage{amsmath}&#10;\usepackage{amssymb}&#10;\pagestyle{empty}&#10;\begin{document}&#10;&#10;\begin{equation*}&#10;\hat{a}(k)= \begin{cases}&#10;p(k) &amp;k&lt;L_p+L_{asm} \\&#10;sgn(\mathbb{R}\{r_{r}(k)\})&amp;k\geq L_p+L_{asm} \quad \&amp; \quad \text{$k$ even}\\&#10;sgn(\mathbb{I}\{r_{r}(k)\})&amp;k\geq L_p+L_{asm} \quad \&amp; \quad \text{$k$ odd}\\&#10;\end{cases}&#10;\end{equation*}&#10;&#10;&#10;&#10;\end{document}"/>
   <p:tag name="IGUANATEXSIZE" val="20"/>
-  <p:tag name="IGUANATEXCURSOR" val="92"/>
+  <p:tag name="IGUANATEXCURSOR" val="265"/>
   <p:tag name="TRANSPARENCY" val="True"/>
   <p:tag name="FILENAME" val=""/>
   <p:tag name="INPUTTYPE" val="0"/>
@@ -6003,12 +7140,76 @@
 
 <file path=ppt/tags/tag15.xml><?xml version="1.0" encoding="utf-8"?>
 <p:tagLst xmlns:a="http://schemas.openxmlformats.org/drawingml/2006/main" xmlns:r="http://schemas.openxmlformats.org/officeDocument/2006/relationships" xmlns:p="http://schemas.openxmlformats.org/presentationml/2006/main">
-  <p:tag name="ORIGINALHEIGHT" val="91.48859"/>
-  <p:tag name="ORIGINALWIDTH" val="194.9756"/>
+  <p:tag name="ORIGINALHEIGHT" val="373.4533"/>
+  <p:tag name="ORIGINALWIDTH" val="2943.382"/>
   <p:tag name="OUTPUTDPI" val="1200"/>
-  <p:tag name="LATEXADDIN" val="\documentclass{article}&#10;\usepackage{amsmath}&#10;\pagestyle{empty}&#10;\begin{document}&#10;&#10;$\mathbf{r}_\text{pkt}$&#10;&#10;&#10;\end{document}"/>
+  <p:tag name="LATEXADDIN" val="\documentclass{article}&#10;\usepackage{amsmath}&#10;\usepackage{amssymb}&#10;\pagestyle{empty}&#10;\begin{document}&#10;&#10;\begin{equation*}&#10;e(k)&#10;= &#10;\begin{cases}&#10;0 &amp;\text{$k$ even} \\&#10;\hat{a}(k-1)\mathbb{I}\{r_r(k-1)\} -  \hat{a}(k)\mathbb{R}\{r_r(k)\}  &amp;\text{$k$ odd}\\&#10;\end{cases}&#10;\end{equation*}&#10;&#10;&#10;&#10;\end{document}"/>
   <p:tag name="IGUANATEXSIZE" val="20"/>
-  <p:tag name="IGUANATEXCURSOR" val="102"/>
+  <p:tag name="IGUANATEXCURSOR" val="225"/>
+  <p:tag name="TRANSPARENCY" val="True"/>
+  <p:tag name="FILENAME" val=""/>
+  <p:tag name="INPUTTYPE" val="0"/>
+  <p:tag name="LATEXENGINEID" val="0"/>
+  <p:tag name="TEMPFOLDER" val="C:\Users\ecestudent\Documents\IguanaTexTemp\"/>
+</p:tagLst>
+</file>
+
+<file path=ppt/tags/tag16.xml><?xml version="1.0" encoding="utf-8"?>
+<p:tagLst xmlns:a="http://schemas.openxmlformats.org/drawingml/2006/main" xmlns:r="http://schemas.openxmlformats.org/officeDocument/2006/relationships" xmlns:p="http://schemas.openxmlformats.org/presentationml/2006/main">
+  <p:tag name="ORIGINALHEIGHT" val="123.7346"/>
+  <p:tag name="ORIGINALWIDTH" val="264.7169"/>
+  <p:tag name="OUTPUTDPI" val="1200"/>
+  <p:tag name="LATEXADDIN" val="\documentclass{article}&#10;\usepackage{amsmath}&#10;\pagestyle{empty}&#10;\begin{document}&#10;&#10;$r_d(k)$&#10;&#10;&#10;\end{document}"/>
+  <p:tag name="IGUANATEXSIZE" val="20"/>
+  <p:tag name="IGUANATEXCURSOR" val="88"/>
+  <p:tag name="TRANSPARENCY" val="True"/>
+  <p:tag name="FILENAME" val=""/>
+  <p:tag name="INPUTTYPE" val="0"/>
+  <p:tag name="LATEXENGINEID" val="0"/>
+  <p:tag name="TEMPFOLDER" val="C:\Users\ecestudent\Documents\IguanaTexTemp\"/>
+</p:tagLst>
+</file>
+
+<file path=ppt/tags/tag17.xml><?xml version="1.0" encoding="utf-8"?>
+<p:tagLst xmlns:a="http://schemas.openxmlformats.org/drawingml/2006/main" xmlns:r="http://schemas.openxmlformats.org/officeDocument/2006/relationships" xmlns:p="http://schemas.openxmlformats.org/presentationml/2006/main">
+  <p:tag name="ORIGINALHEIGHT" val="123.7346"/>
+  <p:tag name="ORIGINALWIDTH" val="206.2243"/>
+  <p:tag name="OUTPUTDPI" val="1200"/>
+  <p:tag name="LATEXADDIN" val="\documentclass{article}&#10;\usepackage{amsmath}&#10;\pagestyle{empty}&#10;\begin{document}&#10;&#10;$e(k)$&#10;&#10;&#10;\end{document}"/>
+  <p:tag name="IGUANATEXSIZE" val="20"/>
+  <p:tag name="IGUANATEXCURSOR" val="83"/>
+  <p:tag name="TRANSPARENCY" val="True"/>
+  <p:tag name="FILENAME" val=""/>
+  <p:tag name="INPUTTYPE" val="0"/>
+  <p:tag name="LATEXENGINEID" val="0"/>
+  <p:tag name="TEMPFOLDER" val="C:\Users\ecestudent\Documents\IguanaTexTemp\"/>
+</p:tagLst>
+</file>
+
+<file path=ppt/tags/tag18.xml><?xml version="1.0" encoding="utf-8"?>
+<p:tagLst xmlns:a="http://schemas.openxmlformats.org/drawingml/2006/main" xmlns:r="http://schemas.openxmlformats.org/officeDocument/2006/relationships" xmlns:p="http://schemas.openxmlformats.org/presentationml/2006/main">
+  <p:tag name="ORIGINALHEIGHT" val="123.7346"/>
+  <p:tag name="ORIGINALWIDTH" val="261.7173"/>
+  <p:tag name="OUTPUTDPI" val="1200"/>
+  <p:tag name="LATEXADDIN" val="\documentclass{article}&#10;\usepackage{amsmath}&#10;\pagestyle{empty}&#10;\begin{document}&#10;&#10;$r_r(k)$&#10;&#10;&#10;\end{document}"/>
+  <p:tag name="IGUANATEXSIZE" val="20"/>
+  <p:tag name="IGUANATEXCURSOR" val="85"/>
+  <p:tag name="TRANSPARENCY" val="True"/>
+  <p:tag name="FILENAME" val=""/>
+  <p:tag name="INPUTTYPE" val="0"/>
+  <p:tag name="LATEXENGINEID" val="0"/>
+  <p:tag name="TEMPFOLDER" val="C:\Users\ecestudent\Documents\IguanaTexTemp\"/>
+</p:tagLst>
+</file>
+
+<file path=ppt/tags/tag19.xml><?xml version="1.0" encoding="utf-8"?>
+<p:tagLst xmlns:a="http://schemas.openxmlformats.org/drawingml/2006/main" xmlns:r="http://schemas.openxmlformats.org/officeDocument/2006/relationships" xmlns:p="http://schemas.openxmlformats.org/presentationml/2006/main">
+  <p:tag name="ORIGINALHEIGHT" val="130.4837"/>
+  <p:tag name="ORIGINALWIDTH" val="305.9617"/>
+  <p:tag name="OUTPUTDPI" val="1200"/>
+  <p:tag name="LATEXADDIN" val="\documentclass{article}&#10;\usepackage{amsmath}&#10;\pagestyle{empty}&#10;\begin{document}&#10;&#10;$e^{\text{-}j\hat{\theta}(k)}$&#10;&#10;&#10;\end{document}"/>
+  <p:tag name="IGUANATEXSIZE" val="20"/>
+  <p:tag name="IGUANATEXCURSOR" val="110"/>
   <p:tag name="TRANSPARENCY" val="True"/>
   <p:tag name="FILENAME" val=""/>
   <p:tag name="INPUTTYPE" val="0"/>
@@ -6025,6 +7226,70 @@
   <p:tag name="LATEXADDIN" val="\documentclass{article}&#10;\usepackage{amsmath}&#10;\pagestyle{empty}&#10;\begin{document}&#10;&#10;$\mathbf{r}_\text{d}$&#10;&#10;&#10;\end{document}"/>
   <p:tag name="IGUANATEXSIZE" val="20"/>
   <p:tag name="IGUANATEXCURSOR" val="101"/>
+  <p:tag name="TRANSPARENCY" val="True"/>
+  <p:tag name="FILENAME" val=""/>
+  <p:tag name="INPUTTYPE" val="0"/>
+  <p:tag name="LATEXENGINEID" val="0"/>
+  <p:tag name="TEMPFOLDER" val="C:\Users\ecestudent\Documents\IguanaTexTemp\"/>
+</p:tagLst>
+</file>
+
+<file path=ppt/tags/tag20.xml><?xml version="1.0" encoding="utf-8"?>
+<p:tagLst xmlns:a="http://schemas.openxmlformats.org/drawingml/2006/main" xmlns:r="http://schemas.openxmlformats.org/officeDocument/2006/relationships" xmlns:p="http://schemas.openxmlformats.org/presentationml/2006/main">
+  <p:tag name="ORIGINALHEIGHT" val="123.7346"/>
+  <p:tag name="ORIGINALWIDTH" val="214.4731"/>
+  <p:tag name="OUTPUTDPI" val="1200"/>
+  <p:tag name="LATEXADDIN" val="\documentclass{article}&#10;\usepackage{amsmath}&#10;\pagestyle{empty}&#10;\begin{document}&#10;&#10;$\hat{a}(k)$&#10;&#10;&#10;\end{document}&#10;"/>
+  <p:tag name="IGUANATEXSIZE" val="20"/>
+  <p:tag name="IGUANATEXCURSOR" val="111"/>
+  <p:tag name="TRANSPARENCY" val="True"/>
+  <p:tag name="FILENAME" val=""/>
+  <p:tag name="INPUTTYPE" val="0"/>
+  <p:tag name="LATEXENGINEID" val="0"/>
+  <p:tag name="TEMPFOLDER" val="C:\Users\ecestudent\Documents\IguanaTexTemp\"/>
+</p:tagLst>
+</file>
+
+<file path=ppt/tags/tag21.xml><?xml version="1.0" encoding="utf-8"?>
+<p:tagLst xmlns:a="http://schemas.openxmlformats.org/drawingml/2006/main" xmlns:r="http://schemas.openxmlformats.org/officeDocument/2006/relationships" xmlns:p="http://schemas.openxmlformats.org/presentationml/2006/main">
+  <p:tag name="ORIGINALHEIGHT" val="103.4871"/>
+  <p:tag name="ORIGINALWIDTH" val="142.4822"/>
+  <p:tag name="OUTPUTDPI" val="1200"/>
+  <p:tag name="LATEXADDIN" val="\documentclass{article}&#10;\usepackage{amsmath}&#10;\pagestyle{empty}&#10;\begin{document}&#10;\begin{equation*}&#10;K_1&#10;\end{equation*}&#10;&#10;&#10;&#10;\end{document}"/>
+  <p:tag name="IGUANATEXSIZE" val="14"/>
+  <p:tag name="IGUANATEXCURSOR" val="101"/>
+  <p:tag name="TRANSPARENCY" val="True"/>
+  <p:tag name="FILENAME" val=""/>
+  <p:tag name="INPUTTYPE" val="0"/>
+  <p:tag name="LATEXENGINEID" val="0"/>
+  <p:tag name="TEMPFOLDER" val="C:\Users\ecestudent\Documents\IguanaTexTemp\"/>
+</p:tagLst>
+</file>
+
+<file path=ppt/tags/tag22.xml><?xml version="1.0" encoding="utf-8"?>
+<p:tagLst xmlns:a="http://schemas.openxmlformats.org/drawingml/2006/main" xmlns:r="http://schemas.openxmlformats.org/officeDocument/2006/relationships" xmlns:p="http://schemas.openxmlformats.org/presentationml/2006/main">
+  <p:tag name="ORIGINALHEIGHT" val="123.7346"/>
+  <p:tag name="ORIGINALWIDTH" val="257.9677"/>
+  <p:tag name="OUTPUTDPI" val="1200"/>
+  <p:tag name="LATEXADDIN" val="\documentclass{article}&#10;\usepackage{amsmath}&#10;\pagestyle{empty}&#10;\begin{document}&#10;&#10;$r_\text{r}(n)$&#10;&#10;&#10;\end{document}"/>
+  <p:tag name="IGUANATEXSIZE" val="20"/>
+  <p:tag name="IGUANATEXCURSOR" val="92"/>
+  <p:tag name="TRANSPARENCY" val="True"/>
+  <p:tag name="FILENAME" val=""/>
+  <p:tag name="INPUTTYPE" val="0"/>
+  <p:tag name="LATEXENGINEID" val="0"/>
+  <p:tag name="TEMPFOLDER" val="C:\Users\ecestudent\Documents\IguanaTexTemp\"/>
+</p:tagLst>
+</file>
+
+<file path=ppt/tags/tag23.xml><?xml version="1.0" encoding="utf-8"?>
+<p:tagLst xmlns:a="http://schemas.openxmlformats.org/drawingml/2006/main" xmlns:r="http://schemas.openxmlformats.org/officeDocument/2006/relationships" xmlns:p="http://schemas.openxmlformats.org/presentationml/2006/main">
+  <p:tag name="ORIGINALHEIGHT" val="91.48859"/>
+  <p:tag name="ORIGINALWIDTH" val="194.9756"/>
+  <p:tag name="OUTPUTDPI" val="1200"/>
+  <p:tag name="LATEXADDIN" val="\documentclass{article}&#10;\usepackage{amsmath}&#10;\pagestyle{empty}&#10;\begin{document}&#10;&#10;$\mathbf{r}_\text{pkt}$&#10;&#10;&#10;\end{document}"/>
+  <p:tag name="IGUANATEXSIZE" val="20"/>
+  <p:tag name="IGUANATEXCURSOR" val="102"/>
   <p:tag name="TRANSPARENCY" val="True"/>
   <p:tag name="FILENAME" val=""/>
   <p:tag name="INPUTTYPE" val="0"/>

</xml_diff>